<commit_message>
maj prez + jars
</commit_message>
<xml_diff>
--- a/Doc/presentation.pptx
+++ b/Doc/presentation.pptx
@@ -9,10 +9,10 @@
     <p:sldMasterId id="2147483679" r:id="rId5"/>
   </p:sldMasterIdLst>
   <p:notesMasterIdLst>
-    <p:notesMasterId r:id="rId25"/>
+    <p:notesMasterId r:id="rId26"/>
   </p:notesMasterIdLst>
   <p:handoutMasterIdLst>
-    <p:handoutMasterId r:id="rId26"/>
+    <p:handoutMasterId r:id="rId27"/>
   </p:handoutMasterIdLst>
   <p:sldIdLst>
     <p:sldId id="265" r:id="rId6"/>
@@ -32,8 +32,9 @@
     <p:sldId id="450" r:id="rId20"/>
     <p:sldId id="281" r:id="rId21"/>
     <p:sldId id="402" r:id="rId22"/>
-    <p:sldId id="451" r:id="rId23"/>
-    <p:sldId id="374" r:id="rId24"/>
+    <p:sldId id="436" r:id="rId23"/>
+    <p:sldId id="451" r:id="rId24"/>
+    <p:sldId id="374" r:id="rId25"/>
   </p:sldIdLst>
   <p:sldSz cx="12192000" cy="6858000"/>
   <p:notesSz cx="6858000" cy="9144000"/>
@@ -1595,7 +1596,7 @@
           <a:p>
             <a:fld id="{250503B6-F4CD-DE49-AB30-479371E8558D}" type="slidenum">
               <a:rPr lang="en-US" smtClean="0"/>
-              <a:t>18</a:t>
+              <a:t>19</a:t>
             </a:fld>
             <a:endParaRPr lang="en-US"/>
           </a:p>
@@ -1682,7 +1683,7 @@
           <a:p>
             <a:fld id="{B42D1794-8E23-418F-9E90-BFD06F197221}" type="slidenum">
               <a:rPr lang="fr-CH" smtClean="0"/>
-              <a:t>19</a:t>
+              <a:t>20</a:t>
             </a:fld>
             <a:endParaRPr lang="fr-CH"/>
           </a:p>
@@ -3399,6 +3400,361 @@
 </file>
 
 <file path=ppt/slideLayouts/slideLayout14.xml><?xml version="1.0" encoding="utf-8"?>
+<p:sldLayout xmlns:a="http://schemas.openxmlformats.org/drawingml/2006/main" xmlns:r="http://schemas.openxmlformats.org/officeDocument/2006/relationships" xmlns:p="http://schemas.openxmlformats.org/presentationml/2006/main" userDrawn="1">
+  <p:cSld name="Title + Section 1">
+    <p:bg>
+      <p:bgRef idx="1001">
+        <a:schemeClr val="bg1"/>
+      </p:bgRef>
+    </p:bg>
+    <p:spTree>
+      <p:nvGrpSpPr>
+        <p:cNvPr id="1" name=""/>
+        <p:cNvGrpSpPr/>
+        <p:nvPr/>
+      </p:nvGrpSpPr>
+      <p:grpSpPr>
+        <a:xfrm>
+          <a:off x="0" y="0"/>
+          <a:ext cx="0" cy="0"/>
+          <a:chOff x="0" y="0"/>
+          <a:chExt cx="0" cy="0"/>
+        </a:xfrm>
+      </p:grpSpPr>
+      <p:sp>
+        <p:nvSpPr>
+          <p:cNvPr id="8" name="Title 1"/>
+          <p:cNvSpPr>
+            <a:spLocks noGrp="1"/>
+          </p:cNvSpPr>
+          <p:nvPr>
+            <p:ph type="title"/>
+          </p:nvPr>
+        </p:nvSpPr>
+        <p:spPr>
+          <a:xfrm>
+            <a:off x="526941" y="573317"/>
+            <a:ext cx="11230421" cy="431020"/>
+          </a:xfrm>
+          <a:prstGeom prst="rect">
+            <a:avLst/>
+          </a:prstGeom>
+        </p:spPr>
+        <p:txBody>
+          <a:bodyPr/>
+          <a:lstStyle>
+            <a:lvl1pPr algn="l">
+              <a:defRPr sz="2400" b="0" i="0">
+                <a:solidFill>
+                  <a:schemeClr val="bg1"/>
+                </a:solidFill>
+                <a:latin typeface="Roboto Medium" charset="0"/>
+                <a:ea typeface="Roboto Medium" charset="0"/>
+                <a:cs typeface="Roboto Medium" charset="0"/>
+              </a:defRPr>
+            </a:lvl1pPr>
+          </a:lstStyle>
+          <a:p>
+            <a:r>
+              <a:rPr lang="en-US" dirty="0"/>
+              <a:t>Click to edit Master title style</a:t>
+            </a:r>
+          </a:p>
+        </p:txBody>
+      </p:sp>
+      <p:sp>
+        <p:nvSpPr>
+          <p:cNvPr id="2" name="TextBox 1"/>
+          <p:cNvSpPr txBox="1"/>
+          <p:nvPr userDrawn="1"/>
+        </p:nvSpPr>
+        <p:spPr>
+          <a:xfrm>
+            <a:off x="526941" y="1232607"/>
+            <a:ext cx="1843280" cy="246221"/>
+          </a:xfrm>
+          <a:prstGeom prst="rect">
+            <a:avLst/>
+          </a:prstGeom>
+          <a:noFill/>
+        </p:spPr>
+        <p:txBody>
+          <a:bodyPr wrap="square" rtlCol="0">
+            <a:spAutoFit/>
+          </a:bodyPr>
+          <a:lstStyle/>
+          <a:p>
+            <a:pPr algn="ctr"/>
+            <a:r>
+              <a:rPr lang="en-US" sz="1000" spc="160" dirty="0">
+                <a:solidFill>
+                  <a:schemeClr val="bg1"/>
+                </a:solidFill>
+                <a:latin typeface="Noto Sans" charset="0"/>
+                <a:ea typeface="Noto Sans" charset="0"/>
+                <a:cs typeface="Noto Sans" charset="0"/>
+              </a:rPr>
+              <a:t>OUR</a:t>
+            </a:r>
+            <a:r>
+              <a:rPr lang="en-US" sz="1000" spc="160" baseline="0" dirty="0">
+                <a:solidFill>
+                  <a:schemeClr val="bg1"/>
+                </a:solidFill>
+                <a:latin typeface="Noto Sans" charset="0"/>
+                <a:ea typeface="Noto Sans" charset="0"/>
+                <a:cs typeface="Noto Sans" charset="0"/>
+              </a:rPr>
+              <a:t> COMPANY</a:t>
+            </a:r>
+            <a:endParaRPr lang="en-US" sz="1000" spc="160" dirty="0">
+              <a:solidFill>
+                <a:schemeClr val="bg1"/>
+              </a:solidFill>
+              <a:latin typeface="Noto Sans" charset="0"/>
+              <a:ea typeface="Noto Sans" charset="0"/>
+              <a:cs typeface="Noto Sans" charset="0"/>
+            </a:endParaRPr>
+          </a:p>
+        </p:txBody>
+      </p:sp>
+      <p:cxnSp>
+        <p:nvCxnSpPr>
+          <p:cNvPr id="6" name="Straight Connector 5"/>
+          <p:cNvCxnSpPr/>
+          <p:nvPr userDrawn="1"/>
+        </p:nvCxnSpPr>
+        <p:spPr>
+          <a:xfrm>
+            <a:off x="526941" y="1602414"/>
+            <a:ext cx="1843280" cy="0"/>
+          </a:xfrm>
+          <a:prstGeom prst="line">
+            <a:avLst/>
+          </a:prstGeom>
+          <a:ln w="57150">
+            <a:solidFill>
+              <a:schemeClr val="accent6"/>
+            </a:solidFill>
+          </a:ln>
+        </p:spPr>
+        <p:style>
+          <a:lnRef idx="1">
+            <a:schemeClr val="accent1"/>
+          </a:lnRef>
+          <a:fillRef idx="0">
+            <a:schemeClr val="accent1"/>
+          </a:fillRef>
+          <a:effectRef idx="0">
+            <a:schemeClr val="accent1"/>
+          </a:effectRef>
+          <a:fontRef idx="minor">
+            <a:schemeClr val="tx1"/>
+          </a:fontRef>
+        </p:style>
+      </p:cxnSp>
+      <p:sp>
+        <p:nvSpPr>
+          <p:cNvPr id="12" name="TextBox 11"/>
+          <p:cNvSpPr txBox="1"/>
+          <p:nvPr userDrawn="1"/>
+        </p:nvSpPr>
+        <p:spPr>
+          <a:xfrm>
+            <a:off x="2604393" y="1232607"/>
+            <a:ext cx="1843280" cy="246221"/>
+          </a:xfrm>
+          <a:prstGeom prst="rect">
+            <a:avLst/>
+          </a:prstGeom>
+          <a:noFill/>
+        </p:spPr>
+        <p:txBody>
+          <a:bodyPr wrap="square" rtlCol="0">
+            <a:spAutoFit/>
+          </a:bodyPr>
+          <a:lstStyle/>
+          <a:p>
+            <a:pPr algn="ctr"/>
+            <a:r>
+              <a:rPr lang="en-US" sz="1000" spc="160" dirty="0">
+                <a:solidFill>
+                  <a:schemeClr val="accent3">
+                    <a:lumMod val="60000"/>
+                    <a:lumOff val="40000"/>
+                  </a:schemeClr>
+                </a:solidFill>
+                <a:latin typeface="Noto Sans" charset="0"/>
+                <a:ea typeface="Noto Sans" charset="0"/>
+                <a:cs typeface="Noto Sans" charset="0"/>
+              </a:rPr>
+              <a:t>ABOUT</a:t>
+            </a:r>
+            <a:r>
+              <a:rPr lang="en-US" sz="1000" spc="160" baseline="0" dirty="0">
+                <a:solidFill>
+                  <a:schemeClr val="accent3">
+                    <a:lumMod val="60000"/>
+                    <a:lumOff val="40000"/>
+                  </a:schemeClr>
+                </a:solidFill>
+                <a:latin typeface="Noto Sans" charset="0"/>
+                <a:ea typeface="Noto Sans" charset="0"/>
+                <a:cs typeface="Noto Sans" charset="0"/>
+              </a:rPr>
+              <a:t> US</a:t>
+            </a:r>
+            <a:endParaRPr lang="en-US" sz="1000" spc="160" dirty="0">
+              <a:solidFill>
+                <a:schemeClr val="accent3">
+                  <a:lumMod val="60000"/>
+                  <a:lumOff val="40000"/>
+                </a:schemeClr>
+              </a:solidFill>
+              <a:latin typeface="Noto Sans" charset="0"/>
+              <a:ea typeface="Noto Sans" charset="0"/>
+              <a:cs typeface="Noto Sans" charset="0"/>
+            </a:endParaRPr>
+          </a:p>
+        </p:txBody>
+      </p:sp>
+      <p:sp>
+        <p:nvSpPr>
+          <p:cNvPr id="13" name="TextBox 12"/>
+          <p:cNvSpPr txBox="1"/>
+          <p:nvPr userDrawn="1"/>
+        </p:nvSpPr>
+        <p:spPr>
+          <a:xfrm>
+            <a:off x="4583588" y="1232607"/>
+            <a:ext cx="1843280" cy="246221"/>
+          </a:xfrm>
+          <a:prstGeom prst="rect">
+            <a:avLst/>
+          </a:prstGeom>
+          <a:noFill/>
+        </p:spPr>
+        <p:txBody>
+          <a:bodyPr wrap="square" rtlCol="0">
+            <a:spAutoFit/>
+          </a:bodyPr>
+          <a:lstStyle/>
+          <a:p>
+            <a:pPr algn="ctr"/>
+            <a:r>
+              <a:rPr lang="en-US" sz="1000" spc="160" dirty="0">
+                <a:solidFill>
+                  <a:schemeClr val="accent3">
+                    <a:lumMod val="60000"/>
+                    <a:lumOff val="40000"/>
+                  </a:schemeClr>
+                </a:solidFill>
+                <a:latin typeface="Noto Sans" charset="0"/>
+                <a:ea typeface="Noto Sans" charset="0"/>
+                <a:cs typeface="Noto Sans" charset="0"/>
+              </a:rPr>
+              <a:t>INFOGRAPHICS</a:t>
+            </a:r>
+          </a:p>
+        </p:txBody>
+      </p:sp>
+      <p:sp>
+        <p:nvSpPr>
+          <p:cNvPr id="14" name="TextBox 13"/>
+          <p:cNvSpPr txBox="1"/>
+          <p:nvPr userDrawn="1"/>
+        </p:nvSpPr>
+        <p:spPr>
+          <a:xfrm>
+            <a:off x="6562782" y="1232607"/>
+            <a:ext cx="1843280" cy="246221"/>
+          </a:xfrm>
+          <a:prstGeom prst="rect">
+            <a:avLst/>
+          </a:prstGeom>
+          <a:noFill/>
+        </p:spPr>
+        <p:txBody>
+          <a:bodyPr wrap="square" rtlCol="0">
+            <a:spAutoFit/>
+          </a:bodyPr>
+          <a:lstStyle/>
+          <a:p>
+            <a:pPr algn="ctr"/>
+            <a:r>
+              <a:rPr lang="en-US" sz="1000" spc="160" dirty="0">
+                <a:solidFill>
+                  <a:schemeClr val="accent3">
+                    <a:lumMod val="60000"/>
+                    <a:lumOff val="40000"/>
+                  </a:schemeClr>
+                </a:solidFill>
+                <a:latin typeface="Noto Sans" charset="0"/>
+                <a:ea typeface="Noto Sans" charset="0"/>
+                <a:cs typeface="Noto Sans" charset="0"/>
+              </a:rPr>
+              <a:t>CONTACT</a:t>
+            </a:r>
+          </a:p>
+        </p:txBody>
+      </p:sp>
+      <p:sp>
+        <p:nvSpPr>
+          <p:cNvPr id="10" name="Slide Number Placeholder 5"/>
+          <p:cNvSpPr>
+            <a:spLocks noGrp="1"/>
+          </p:cNvSpPr>
+          <p:nvPr>
+            <p:ph type="sldNum" sz="quarter" idx="4"/>
+          </p:nvPr>
+        </p:nvSpPr>
+        <p:spPr>
+          <a:xfrm>
+            <a:off x="10919018" y="1346518"/>
+            <a:ext cx="725296" cy="365125"/>
+          </a:xfrm>
+          <a:prstGeom prst="rect">
+            <a:avLst/>
+          </a:prstGeom>
+        </p:spPr>
+        <p:txBody>
+          <a:bodyPr anchor="ctr"/>
+          <a:lstStyle>
+            <a:lvl1pPr algn="ctr">
+              <a:defRPr sz="1600" b="0" i="0">
+                <a:solidFill>
+                  <a:schemeClr val="bg1"/>
+                </a:solidFill>
+                <a:latin typeface="Roboto Light" charset="0"/>
+                <a:ea typeface="Roboto Light" charset="0"/>
+                <a:cs typeface="Roboto Light" charset="0"/>
+              </a:defRPr>
+            </a:lvl1pPr>
+          </a:lstStyle>
+          <a:p>
+            <a:fld id="{936C95AE-7298-45E1-9514-94AFF5BED89B}" type="slidenum">
+              <a:rPr lang="en-US" smtClean="0"/>
+              <a:pPr/>
+              <a:t>‹N°›</a:t>
+            </a:fld>
+            <a:endParaRPr lang="en-US" dirty="0"/>
+          </a:p>
+        </p:txBody>
+      </p:sp>
+    </p:spTree>
+    <p:extLst>
+      <p:ext uri="{BB962C8B-B14F-4D97-AF65-F5344CB8AC3E}">
+        <p14:creationId xmlns:p14="http://schemas.microsoft.com/office/powerpoint/2010/main" val="2149766269"/>
+      </p:ext>
+    </p:extLst>
+  </p:cSld>
+  <p:clrMapOvr>
+    <a:overrideClrMapping bg1="lt1" tx1="dk1" bg2="lt2" tx2="dk2" accent1="accent1" accent2="accent2" accent3="accent3" accent4="accent4" accent5="accent5" accent6="accent6" hlink="hlink" folHlink="folHlink"/>
+  </p:clrMapOvr>
+</p:sldLayout>
+</file>
+
+<file path=ppt/slideLayouts/slideLayout15.xml><?xml version="1.0" encoding="utf-8"?>
 <p:sldLayout xmlns:a="http://schemas.openxmlformats.org/drawingml/2006/main" xmlns:r="http://schemas.openxmlformats.org/officeDocument/2006/relationships" xmlns:p="http://schemas.openxmlformats.org/presentationml/2006/main" preserve="1" userDrawn="1">
   <p:cSld name="Blank">
     <p:bg>
@@ -3433,7 +3789,7 @@
 </p:sldLayout>
 </file>
 
-<file path=ppt/slideLayouts/slideLayout15.xml><?xml version="1.0" encoding="utf-8"?>
+<file path=ppt/slideLayouts/slideLayout16.xml><?xml version="1.0" encoding="utf-8"?>
 <p:sldLayout xmlns:a="http://schemas.openxmlformats.org/drawingml/2006/main" xmlns:r="http://schemas.openxmlformats.org/officeDocument/2006/relationships" xmlns:p="http://schemas.openxmlformats.org/presentationml/2006/main" preserve="1" userDrawn="1">
   <p:cSld name="Blank with Slide Nr.">
     <p:bg>
@@ -3508,7 +3864,7 @@
 </p:sldLayout>
 </file>
 
-<file path=ppt/slideLayouts/slideLayout16.xml><?xml version="1.0" encoding="utf-8"?>
+<file path=ppt/slideLayouts/slideLayout17.xml><?xml version="1.0" encoding="utf-8"?>
 <p:sldLayout xmlns:a="http://schemas.openxmlformats.org/drawingml/2006/main" xmlns:r="http://schemas.openxmlformats.org/officeDocument/2006/relationships" xmlns:p="http://schemas.openxmlformats.org/presentationml/2006/main" userDrawn="1">
   <p:cSld name="Title + Subtitle (Left)">
     <p:bg>
@@ -3682,7 +4038,7 @@
 </p:sldLayout>
 </file>
 
-<file path=ppt/slideLayouts/slideLayout17.xml><?xml version="1.0" encoding="utf-8"?>
+<file path=ppt/slideLayouts/slideLayout18.xml><?xml version="1.0" encoding="utf-8"?>
 <p:sldLayout xmlns:a="http://schemas.openxmlformats.org/drawingml/2006/main" xmlns:r="http://schemas.openxmlformats.org/officeDocument/2006/relationships" xmlns:p="http://schemas.openxmlformats.org/presentationml/2006/main" userDrawn="1">
   <p:cSld name="Title + Section 3">
     <p:bg>
@@ -4018,7 +4374,7 @@
 </p:sldLayout>
 </file>
 
-<file path=ppt/slideLayouts/slideLayout18.xml><?xml version="1.0" encoding="utf-8"?>
+<file path=ppt/slideLayouts/slideLayout19.xml><?xml version="1.0" encoding="utf-8"?>
 <p:sldLayout xmlns:a="http://schemas.openxmlformats.org/drawingml/2006/main" xmlns:r="http://schemas.openxmlformats.org/officeDocument/2006/relationships" xmlns:p="http://schemas.openxmlformats.org/presentationml/2006/main" preserve="1" userDrawn="1">
   <p:cSld name="Title + Subtitle">
     <p:bg>
@@ -4189,7 +4545,207 @@
 </p:sldLayout>
 </file>
 
-<file path=ppt/slideLayouts/slideLayout19.xml><?xml version="1.0" encoding="utf-8"?>
+<file path=ppt/slideLayouts/slideLayout2.xml><?xml version="1.0" encoding="utf-8"?>
+<p:sldLayout xmlns:a="http://schemas.openxmlformats.org/drawingml/2006/main" xmlns:r="http://schemas.openxmlformats.org/officeDocument/2006/relationships" xmlns:p="http://schemas.openxmlformats.org/presentationml/2006/main" type="obj" preserve="1">
+  <p:cSld name="Titre et contenu">
+    <p:spTree>
+      <p:nvGrpSpPr>
+        <p:cNvPr id="1" name=""/>
+        <p:cNvGrpSpPr/>
+        <p:nvPr/>
+      </p:nvGrpSpPr>
+      <p:grpSpPr>
+        <a:xfrm>
+          <a:off x="0" y="0"/>
+          <a:ext cx="0" cy="0"/>
+          <a:chOff x="0" y="0"/>
+          <a:chExt cx="0" cy="0"/>
+        </a:xfrm>
+      </p:grpSpPr>
+      <p:sp>
+        <p:nvSpPr>
+          <p:cNvPr id="2" name="Titre 1">
+            <a:extLst>
+              <a:ext uri="{FF2B5EF4-FFF2-40B4-BE49-F238E27FC236}">
+                <a16:creationId xmlns:a16="http://schemas.microsoft.com/office/drawing/2014/main" id="{848AE1DD-0584-4650-9382-710B029837DF}"/>
+              </a:ext>
+            </a:extLst>
+          </p:cNvPr>
+          <p:cNvSpPr>
+            <a:spLocks noGrp="1"/>
+          </p:cNvSpPr>
+          <p:nvPr>
+            <p:ph type="title"/>
+          </p:nvPr>
+        </p:nvSpPr>
+        <p:spPr/>
+        <p:txBody>
+          <a:bodyPr/>
+          <a:lstStyle/>
+          <a:p>
+            <a:r>
+              <a:rPr lang="fr-FR"/>
+              <a:t>Modifiez le style du titre</a:t>
+            </a:r>
+            <a:endParaRPr lang="fr-CH"/>
+          </a:p>
+        </p:txBody>
+      </p:sp>
+      <p:sp>
+        <p:nvSpPr>
+          <p:cNvPr id="3" name="Espace réservé du contenu 2">
+            <a:extLst>
+              <a:ext uri="{FF2B5EF4-FFF2-40B4-BE49-F238E27FC236}">
+                <a16:creationId xmlns:a16="http://schemas.microsoft.com/office/drawing/2014/main" id="{27BAA40E-C604-4FAA-AE2F-4C7EEBBF35BA}"/>
+              </a:ext>
+            </a:extLst>
+          </p:cNvPr>
+          <p:cNvSpPr>
+            <a:spLocks noGrp="1"/>
+          </p:cNvSpPr>
+          <p:nvPr>
+            <p:ph idx="1"/>
+          </p:nvPr>
+        </p:nvSpPr>
+        <p:spPr/>
+        <p:txBody>
+          <a:bodyPr/>
+          <a:lstStyle/>
+          <a:p>
+            <a:pPr lvl="0"/>
+            <a:r>
+              <a:rPr lang="fr-FR"/>
+              <a:t>Modifier les styles du texte du masque</a:t>
+            </a:r>
+          </a:p>
+          <a:p>
+            <a:pPr lvl="1"/>
+            <a:r>
+              <a:rPr lang="fr-FR"/>
+              <a:t>Deuxième niveau</a:t>
+            </a:r>
+          </a:p>
+          <a:p>
+            <a:pPr lvl="2"/>
+            <a:r>
+              <a:rPr lang="fr-FR"/>
+              <a:t>Troisième niveau</a:t>
+            </a:r>
+          </a:p>
+          <a:p>
+            <a:pPr lvl="3"/>
+            <a:r>
+              <a:rPr lang="fr-FR"/>
+              <a:t>Quatrième niveau</a:t>
+            </a:r>
+          </a:p>
+          <a:p>
+            <a:pPr lvl="4"/>
+            <a:r>
+              <a:rPr lang="fr-FR"/>
+              <a:t>Cinquième niveau</a:t>
+            </a:r>
+            <a:endParaRPr lang="fr-CH"/>
+          </a:p>
+        </p:txBody>
+      </p:sp>
+      <p:sp>
+        <p:nvSpPr>
+          <p:cNvPr id="4" name="Espace réservé de la date 3">
+            <a:extLst>
+              <a:ext uri="{FF2B5EF4-FFF2-40B4-BE49-F238E27FC236}">
+                <a16:creationId xmlns:a16="http://schemas.microsoft.com/office/drawing/2014/main" id="{CFC5014A-8D00-427B-B7C0-03413D2914EF}"/>
+              </a:ext>
+            </a:extLst>
+          </p:cNvPr>
+          <p:cNvSpPr>
+            <a:spLocks noGrp="1"/>
+          </p:cNvSpPr>
+          <p:nvPr>
+            <p:ph type="dt" sz="half" idx="10"/>
+          </p:nvPr>
+        </p:nvSpPr>
+        <p:spPr/>
+        <p:txBody>
+          <a:bodyPr/>
+          <a:lstStyle/>
+          <a:p>
+            <a:fld id="{7DAECAA3-EED9-4F83-9C39-4E8F2572032F}" type="datetimeFigureOut">
+              <a:rPr lang="fr-CH" smtClean="0"/>
+              <a:t>15.06.2018</a:t>
+            </a:fld>
+            <a:endParaRPr lang="fr-CH"/>
+          </a:p>
+        </p:txBody>
+      </p:sp>
+      <p:sp>
+        <p:nvSpPr>
+          <p:cNvPr id="5" name="Espace réservé du pied de page 4">
+            <a:extLst>
+              <a:ext uri="{FF2B5EF4-FFF2-40B4-BE49-F238E27FC236}">
+                <a16:creationId xmlns:a16="http://schemas.microsoft.com/office/drawing/2014/main" id="{2428FFA8-0E85-4792-B20A-3F9C5818FFAF}"/>
+              </a:ext>
+            </a:extLst>
+          </p:cNvPr>
+          <p:cNvSpPr>
+            <a:spLocks noGrp="1"/>
+          </p:cNvSpPr>
+          <p:nvPr>
+            <p:ph type="ftr" sz="quarter" idx="11"/>
+          </p:nvPr>
+        </p:nvSpPr>
+        <p:spPr/>
+        <p:txBody>
+          <a:bodyPr/>
+          <a:lstStyle/>
+          <a:p>
+            <a:endParaRPr lang="fr-CH"/>
+          </a:p>
+        </p:txBody>
+      </p:sp>
+      <p:sp>
+        <p:nvSpPr>
+          <p:cNvPr id="6" name="Espace réservé du numéro de diapositive 5">
+            <a:extLst>
+              <a:ext uri="{FF2B5EF4-FFF2-40B4-BE49-F238E27FC236}">
+                <a16:creationId xmlns:a16="http://schemas.microsoft.com/office/drawing/2014/main" id="{5AD3227D-8088-41CD-8BB1-C5A9485DBCA8}"/>
+              </a:ext>
+            </a:extLst>
+          </p:cNvPr>
+          <p:cNvSpPr>
+            <a:spLocks noGrp="1"/>
+          </p:cNvSpPr>
+          <p:nvPr>
+            <p:ph type="sldNum" sz="quarter" idx="12"/>
+          </p:nvPr>
+        </p:nvSpPr>
+        <p:spPr/>
+        <p:txBody>
+          <a:bodyPr/>
+          <a:lstStyle/>
+          <a:p>
+            <a:fld id="{9325FB86-ECE3-40B9-B8CA-81B3DEC214F6}" type="slidenum">
+              <a:rPr lang="fr-CH" smtClean="0"/>
+              <a:t>‹N°›</a:t>
+            </a:fld>
+            <a:endParaRPr lang="fr-CH"/>
+          </a:p>
+        </p:txBody>
+      </p:sp>
+    </p:spTree>
+    <p:extLst>
+      <p:ext uri="{BB962C8B-B14F-4D97-AF65-F5344CB8AC3E}">
+        <p14:creationId xmlns:p14="http://schemas.microsoft.com/office/powerpoint/2010/main" val="905324329"/>
+      </p:ext>
+    </p:extLst>
+  </p:cSld>
+  <p:clrMapOvr>
+    <a:masterClrMapping/>
+  </p:clrMapOvr>
+</p:sldLayout>
+</file>
+
+<file path=ppt/slideLayouts/slideLayout20.xml><?xml version="1.0" encoding="utf-8"?>
 <p:sldLayout xmlns:a="http://schemas.openxmlformats.org/drawingml/2006/main" xmlns:r="http://schemas.openxmlformats.org/officeDocument/2006/relationships" xmlns:p="http://schemas.openxmlformats.org/presentationml/2006/main" preserve="1" userDrawn="1">
   <p:cSld name="Title + Section 1">
     <p:bg>
@@ -4482,207 +5038,7 @@
 </p:sldLayout>
 </file>
 
-<file path=ppt/slideLayouts/slideLayout2.xml><?xml version="1.0" encoding="utf-8"?>
-<p:sldLayout xmlns:a="http://schemas.openxmlformats.org/drawingml/2006/main" xmlns:r="http://schemas.openxmlformats.org/officeDocument/2006/relationships" xmlns:p="http://schemas.openxmlformats.org/presentationml/2006/main" type="obj" preserve="1">
-  <p:cSld name="Titre et contenu">
-    <p:spTree>
-      <p:nvGrpSpPr>
-        <p:cNvPr id="1" name=""/>
-        <p:cNvGrpSpPr/>
-        <p:nvPr/>
-      </p:nvGrpSpPr>
-      <p:grpSpPr>
-        <a:xfrm>
-          <a:off x="0" y="0"/>
-          <a:ext cx="0" cy="0"/>
-          <a:chOff x="0" y="0"/>
-          <a:chExt cx="0" cy="0"/>
-        </a:xfrm>
-      </p:grpSpPr>
-      <p:sp>
-        <p:nvSpPr>
-          <p:cNvPr id="2" name="Titre 1">
-            <a:extLst>
-              <a:ext uri="{FF2B5EF4-FFF2-40B4-BE49-F238E27FC236}">
-                <a16:creationId xmlns:a16="http://schemas.microsoft.com/office/drawing/2014/main" id="{848AE1DD-0584-4650-9382-710B029837DF}"/>
-              </a:ext>
-            </a:extLst>
-          </p:cNvPr>
-          <p:cNvSpPr>
-            <a:spLocks noGrp="1"/>
-          </p:cNvSpPr>
-          <p:nvPr>
-            <p:ph type="title"/>
-          </p:nvPr>
-        </p:nvSpPr>
-        <p:spPr/>
-        <p:txBody>
-          <a:bodyPr/>
-          <a:lstStyle/>
-          <a:p>
-            <a:r>
-              <a:rPr lang="fr-FR"/>
-              <a:t>Modifiez le style du titre</a:t>
-            </a:r>
-            <a:endParaRPr lang="fr-CH"/>
-          </a:p>
-        </p:txBody>
-      </p:sp>
-      <p:sp>
-        <p:nvSpPr>
-          <p:cNvPr id="3" name="Espace réservé du contenu 2">
-            <a:extLst>
-              <a:ext uri="{FF2B5EF4-FFF2-40B4-BE49-F238E27FC236}">
-                <a16:creationId xmlns:a16="http://schemas.microsoft.com/office/drawing/2014/main" id="{27BAA40E-C604-4FAA-AE2F-4C7EEBBF35BA}"/>
-              </a:ext>
-            </a:extLst>
-          </p:cNvPr>
-          <p:cNvSpPr>
-            <a:spLocks noGrp="1"/>
-          </p:cNvSpPr>
-          <p:nvPr>
-            <p:ph idx="1"/>
-          </p:nvPr>
-        </p:nvSpPr>
-        <p:spPr/>
-        <p:txBody>
-          <a:bodyPr/>
-          <a:lstStyle/>
-          <a:p>
-            <a:pPr lvl="0"/>
-            <a:r>
-              <a:rPr lang="fr-FR"/>
-              <a:t>Modifier les styles du texte du masque</a:t>
-            </a:r>
-          </a:p>
-          <a:p>
-            <a:pPr lvl="1"/>
-            <a:r>
-              <a:rPr lang="fr-FR"/>
-              <a:t>Deuxième niveau</a:t>
-            </a:r>
-          </a:p>
-          <a:p>
-            <a:pPr lvl="2"/>
-            <a:r>
-              <a:rPr lang="fr-FR"/>
-              <a:t>Troisième niveau</a:t>
-            </a:r>
-          </a:p>
-          <a:p>
-            <a:pPr lvl="3"/>
-            <a:r>
-              <a:rPr lang="fr-FR"/>
-              <a:t>Quatrième niveau</a:t>
-            </a:r>
-          </a:p>
-          <a:p>
-            <a:pPr lvl="4"/>
-            <a:r>
-              <a:rPr lang="fr-FR"/>
-              <a:t>Cinquième niveau</a:t>
-            </a:r>
-            <a:endParaRPr lang="fr-CH"/>
-          </a:p>
-        </p:txBody>
-      </p:sp>
-      <p:sp>
-        <p:nvSpPr>
-          <p:cNvPr id="4" name="Espace réservé de la date 3">
-            <a:extLst>
-              <a:ext uri="{FF2B5EF4-FFF2-40B4-BE49-F238E27FC236}">
-                <a16:creationId xmlns:a16="http://schemas.microsoft.com/office/drawing/2014/main" id="{CFC5014A-8D00-427B-B7C0-03413D2914EF}"/>
-              </a:ext>
-            </a:extLst>
-          </p:cNvPr>
-          <p:cNvSpPr>
-            <a:spLocks noGrp="1"/>
-          </p:cNvSpPr>
-          <p:nvPr>
-            <p:ph type="dt" sz="half" idx="10"/>
-          </p:nvPr>
-        </p:nvSpPr>
-        <p:spPr/>
-        <p:txBody>
-          <a:bodyPr/>
-          <a:lstStyle/>
-          <a:p>
-            <a:fld id="{7DAECAA3-EED9-4F83-9C39-4E8F2572032F}" type="datetimeFigureOut">
-              <a:rPr lang="fr-CH" smtClean="0"/>
-              <a:t>15.06.2018</a:t>
-            </a:fld>
-            <a:endParaRPr lang="fr-CH"/>
-          </a:p>
-        </p:txBody>
-      </p:sp>
-      <p:sp>
-        <p:nvSpPr>
-          <p:cNvPr id="5" name="Espace réservé du pied de page 4">
-            <a:extLst>
-              <a:ext uri="{FF2B5EF4-FFF2-40B4-BE49-F238E27FC236}">
-                <a16:creationId xmlns:a16="http://schemas.microsoft.com/office/drawing/2014/main" id="{2428FFA8-0E85-4792-B20A-3F9C5818FFAF}"/>
-              </a:ext>
-            </a:extLst>
-          </p:cNvPr>
-          <p:cNvSpPr>
-            <a:spLocks noGrp="1"/>
-          </p:cNvSpPr>
-          <p:nvPr>
-            <p:ph type="ftr" sz="quarter" idx="11"/>
-          </p:nvPr>
-        </p:nvSpPr>
-        <p:spPr/>
-        <p:txBody>
-          <a:bodyPr/>
-          <a:lstStyle/>
-          <a:p>
-            <a:endParaRPr lang="fr-CH"/>
-          </a:p>
-        </p:txBody>
-      </p:sp>
-      <p:sp>
-        <p:nvSpPr>
-          <p:cNvPr id="6" name="Espace réservé du numéro de diapositive 5">
-            <a:extLst>
-              <a:ext uri="{FF2B5EF4-FFF2-40B4-BE49-F238E27FC236}">
-                <a16:creationId xmlns:a16="http://schemas.microsoft.com/office/drawing/2014/main" id="{5AD3227D-8088-41CD-8BB1-C5A9485DBCA8}"/>
-              </a:ext>
-            </a:extLst>
-          </p:cNvPr>
-          <p:cNvSpPr>
-            <a:spLocks noGrp="1"/>
-          </p:cNvSpPr>
-          <p:nvPr>
-            <p:ph type="sldNum" sz="quarter" idx="12"/>
-          </p:nvPr>
-        </p:nvSpPr>
-        <p:spPr/>
-        <p:txBody>
-          <a:bodyPr/>
-          <a:lstStyle/>
-          <a:p>
-            <a:fld id="{9325FB86-ECE3-40B9-B8CA-81B3DEC214F6}" type="slidenum">
-              <a:rPr lang="fr-CH" smtClean="0"/>
-              <a:t>‹N°›</a:t>
-            </a:fld>
-            <a:endParaRPr lang="fr-CH"/>
-          </a:p>
-        </p:txBody>
-      </p:sp>
-    </p:spTree>
-    <p:extLst>
-      <p:ext uri="{BB962C8B-B14F-4D97-AF65-F5344CB8AC3E}">
-        <p14:creationId xmlns:p14="http://schemas.microsoft.com/office/powerpoint/2010/main" val="905324329"/>
-      </p:ext>
-    </p:extLst>
-  </p:cSld>
-  <p:clrMapOvr>
-    <a:masterClrMapping/>
-  </p:clrMapOvr>
-</p:sldLayout>
-</file>
-
-<file path=ppt/slideLayouts/slideLayout20.xml><?xml version="1.0" encoding="utf-8"?>
+<file path=ppt/slideLayouts/slideLayout21.xml><?xml version="1.0" encoding="utf-8"?>
 <p:sldLayout xmlns:a="http://schemas.openxmlformats.org/drawingml/2006/main" xmlns:r="http://schemas.openxmlformats.org/officeDocument/2006/relationships" xmlns:p="http://schemas.openxmlformats.org/presentationml/2006/main" preserve="1" userDrawn="1">
   <p:cSld name="Title + Section 2">
     <p:bg>
@@ -4988,7 +5344,7 @@
 </p:sldLayout>
 </file>
 
-<file path=ppt/slideLayouts/slideLayout21.xml><?xml version="1.0" encoding="utf-8"?>
+<file path=ppt/slideLayouts/slideLayout22.xml><?xml version="1.0" encoding="utf-8"?>
 <p:sldLayout xmlns:a="http://schemas.openxmlformats.org/drawingml/2006/main" xmlns:r="http://schemas.openxmlformats.org/officeDocument/2006/relationships" xmlns:p="http://schemas.openxmlformats.org/presentationml/2006/main" preserve="1" userDrawn="1">
   <p:cSld name="Title + Section 3">
     <p:bg>
@@ -5278,7 +5634,7 @@
 </p:sldLayout>
 </file>
 
-<file path=ppt/slideLayouts/slideLayout22.xml><?xml version="1.0" encoding="utf-8"?>
+<file path=ppt/slideLayouts/slideLayout23.xml><?xml version="1.0" encoding="utf-8"?>
 <p:sldLayout xmlns:a="http://schemas.openxmlformats.org/drawingml/2006/main" xmlns:r="http://schemas.openxmlformats.org/officeDocument/2006/relationships" xmlns:p="http://schemas.openxmlformats.org/presentationml/2006/main" preserve="1" userDrawn="1">
   <p:cSld name="Title + Section 4">
     <p:bg>
@@ -5614,7 +5970,7 @@
 </p:sldLayout>
 </file>
 
-<file path=ppt/slideLayouts/slideLayout23.xml><?xml version="1.0" encoding="utf-8"?>
+<file path=ppt/slideLayouts/slideLayout24.xml><?xml version="1.0" encoding="utf-8"?>
 <p:sldLayout xmlns:a="http://schemas.openxmlformats.org/drawingml/2006/main" xmlns:r="http://schemas.openxmlformats.org/officeDocument/2006/relationships" xmlns:p="http://schemas.openxmlformats.org/presentationml/2006/main" userDrawn="1">
   <p:cSld name="Blank with Slide Nr.">
     <p:bg>
@@ -5689,7 +6045,7 @@
 </p:sldLayout>
 </file>
 
-<file path=ppt/slideLayouts/slideLayout24.xml><?xml version="1.0" encoding="utf-8"?>
+<file path=ppt/slideLayouts/slideLayout25.xml><?xml version="1.0" encoding="utf-8"?>
 <p:sldLayout xmlns:a="http://schemas.openxmlformats.org/drawingml/2006/main" xmlns:r="http://schemas.openxmlformats.org/officeDocument/2006/relationships" xmlns:p="http://schemas.openxmlformats.org/presentationml/2006/main" userDrawn="1">
   <p:cSld name="Blank">
     <p:bg>
@@ -5764,7 +6120,7 @@
 </p:sldLayout>
 </file>
 
-<file path=ppt/slideLayouts/slideLayout25.xml><?xml version="1.0" encoding="utf-8"?>
+<file path=ppt/slideLayouts/slideLayout26.xml><?xml version="1.0" encoding="utf-8"?>
 <p:sldLayout xmlns:a="http://schemas.openxmlformats.org/drawingml/2006/main" xmlns:r="http://schemas.openxmlformats.org/officeDocument/2006/relationships" xmlns:p="http://schemas.openxmlformats.org/presentationml/2006/main" preserve="1" userDrawn="1">
   <p:cSld name="Title + Subtitle (Left)">
     <p:bg>
@@ -5938,7 +6294,7 @@
 </p:sldLayout>
 </file>
 
-<file path=ppt/slideLayouts/slideLayout26.xml><?xml version="1.0" encoding="utf-8"?>
+<file path=ppt/slideLayouts/slideLayout27.xml><?xml version="1.0" encoding="utf-8"?>
 <p:sldLayout xmlns:a="http://schemas.openxmlformats.org/drawingml/2006/main" xmlns:r="http://schemas.openxmlformats.org/officeDocument/2006/relationships" xmlns:p="http://schemas.openxmlformats.org/presentationml/2006/main" preserve="1" userDrawn="1">
   <p:cSld name="Title + Subtitle (Centered)">
     <p:bg>
@@ -6113,7 +6469,7 @@
 </p:sldLayout>
 </file>
 
-<file path=ppt/slideLayouts/slideLayout27.xml><?xml version="1.0" encoding="utf-8"?>
+<file path=ppt/slideLayouts/slideLayout28.xml><?xml version="1.0" encoding="utf-8"?>
 <p:sldLayout xmlns:a="http://schemas.openxmlformats.org/drawingml/2006/main" xmlns:r="http://schemas.openxmlformats.org/officeDocument/2006/relationships" xmlns:p="http://schemas.openxmlformats.org/presentationml/2006/main" userDrawn="1">
   <p:cSld name="Blank">
     <p:bg>
@@ -6188,7 +6544,7 @@
 </p:sldLayout>
 </file>
 
-<file path=ppt/slideLayouts/slideLayout28.xml><?xml version="1.0" encoding="utf-8"?>
+<file path=ppt/slideLayouts/slideLayout29.xml><?xml version="1.0" encoding="utf-8"?>
 <p:sldLayout xmlns:a="http://schemas.openxmlformats.org/drawingml/2006/main" xmlns:r="http://schemas.openxmlformats.org/officeDocument/2006/relationships" xmlns:p="http://schemas.openxmlformats.org/presentationml/2006/main" preserve="1" userDrawn="1">
   <p:cSld name="Title + Subtitle">
     <p:bg>
@@ -6350,361 +6706,6 @@
     <p:extLst>
       <p:ext uri="{BB962C8B-B14F-4D97-AF65-F5344CB8AC3E}">
         <p14:creationId xmlns:p14="http://schemas.microsoft.com/office/powerpoint/2010/main" val="48285337"/>
-      </p:ext>
-    </p:extLst>
-  </p:cSld>
-  <p:clrMapOvr>
-    <a:overrideClrMapping bg1="lt1" tx1="dk1" bg2="lt2" tx2="dk2" accent1="accent1" accent2="accent2" accent3="accent3" accent4="accent4" accent5="accent5" accent6="accent6" hlink="hlink" folHlink="folHlink"/>
-  </p:clrMapOvr>
-</p:sldLayout>
-</file>
-
-<file path=ppt/slideLayouts/slideLayout29.xml><?xml version="1.0" encoding="utf-8"?>
-<p:sldLayout xmlns:a="http://schemas.openxmlformats.org/drawingml/2006/main" xmlns:r="http://schemas.openxmlformats.org/officeDocument/2006/relationships" xmlns:p="http://schemas.openxmlformats.org/presentationml/2006/main" preserve="1" userDrawn="1">
-  <p:cSld name="Title + Section 1">
-    <p:bg>
-      <p:bgRef idx="1001">
-        <a:schemeClr val="bg1"/>
-      </p:bgRef>
-    </p:bg>
-    <p:spTree>
-      <p:nvGrpSpPr>
-        <p:cNvPr id="1" name=""/>
-        <p:cNvGrpSpPr/>
-        <p:nvPr/>
-      </p:nvGrpSpPr>
-      <p:grpSpPr>
-        <a:xfrm>
-          <a:off x="0" y="0"/>
-          <a:ext cx="0" cy="0"/>
-          <a:chOff x="0" y="0"/>
-          <a:chExt cx="0" cy="0"/>
-        </a:xfrm>
-      </p:grpSpPr>
-      <p:sp>
-        <p:nvSpPr>
-          <p:cNvPr id="8" name="Title 1"/>
-          <p:cNvSpPr>
-            <a:spLocks noGrp="1"/>
-          </p:cNvSpPr>
-          <p:nvPr>
-            <p:ph type="title"/>
-          </p:nvPr>
-        </p:nvSpPr>
-        <p:spPr>
-          <a:xfrm>
-            <a:off x="526941" y="573317"/>
-            <a:ext cx="11230421" cy="431020"/>
-          </a:xfrm>
-          <a:prstGeom prst="rect">
-            <a:avLst/>
-          </a:prstGeom>
-        </p:spPr>
-        <p:txBody>
-          <a:bodyPr/>
-          <a:lstStyle>
-            <a:lvl1pPr algn="l">
-              <a:defRPr sz="2400" b="0" i="0">
-                <a:solidFill>
-                  <a:schemeClr val="bg1"/>
-                </a:solidFill>
-                <a:latin typeface="Roboto Medium" charset="0"/>
-                <a:ea typeface="Roboto Medium" charset="0"/>
-                <a:cs typeface="Roboto Medium" charset="0"/>
-              </a:defRPr>
-            </a:lvl1pPr>
-          </a:lstStyle>
-          <a:p>
-            <a:r>
-              <a:rPr lang="en-US" dirty="0"/>
-              <a:t>Click to edit Master title style</a:t>
-            </a:r>
-          </a:p>
-        </p:txBody>
-      </p:sp>
-      <p:sp>
-        <p:nvSpPr>
-          <p:cNvPr id="2" name="TextBox 1"/>
-          <p:cNvSpPr txBox="1"/>
-          <p:nvPr userDrawn="1"/>
-        </p:nvSpPr>
-        <p:spPr>
-          <a:xfrm>
-            <a:off x="526941" y="1232607"/>
-            <a:ext cx="1843280" cy="246221"/>
-          </a:xfrm>
-          <a:prstGeom prst="rect">
-            <a:avLst/>
-          </a:prstGeom>
-          <a:noFill/>
-        </p:spPr>
-        <p:txBody>
-          <a:bodyPr wrap="square" rtlCol="0">
-            <a:spAutoFit/>
-          </a:bodyPr>
-          <a:lstStyle/>
-          <a:p>
-            <a:pPr algn="ctr"/>
-            <a:r>
-              <a:rPr lang="en-US" sz="1000" spc="160" dirty="0">
-                <a:solidFill>
-                  <a:schemeClr val="bg1"/>
-                </a:solidFill>
-                <a:latin typeface="Noto Sans" charset="0"/>
-                <a:ea typeface="Noto Sans" charset="0"/>
-                <a:cs typeface="Noto Sans" charset="0"/>
-              </a:rPr>
-              <a:t>OUR</a:t>
-            </a:r>
-            <a:r>
-              <a:rPr lang="en-US" sz="1000" spc="160" baseline="0" dirty="0">
-                <a:solidFill>
-                  <a:schemeClr val="bg1"/>
-                </a:solidFill>
-                <a:latin typeface="Noto Sans" charset="0"/>
-                <a:ea typeface="Noto Sans" charset="0"/>
-                <a:cs typeface="Noto Sans" charset="0"/>
-              </a:rPr>
-              <a:t> COMPANY</a:t>
-            </a:r>
-            <a:endParaRPr lang="en-US" sz="1000" spc="160" dirty="0">
-              <a:solidFill>
-                <a:schemeClr val="bg1"/>
-              </a:solidFill>
-              <a:latin typeface="Noto Sans" charset="0"/>
-              <a:ea typeface="Noto Sans" charset="0"/>
-              <a:cs typeface="Noto Sans" charset="0"/>
-            </a:endParaRPr>
-          </a:p>
-        </p:txBody>
-      </p:sp>
-      <p:cxnSp>
-        <p:nvCxnSpPr>
-          <p:cNvPr id="6" name="Straight Connector 5"/>
-          <p:cNvCxnSpPr/>
-          <p:nvPr userDrawn="1"/>
-        </p:nvCxnSpPr>
-        <p:spPr>
-          <a:xfrm>
-            <a:off x="526941" y="1602414"/>
-            <a:ext cx="1843280" cy="0"/>
-          </a:xfrm>
-          <a:prstGeom prst="line">
-            <a:avLst/>
-          </a:prstGeom>
-          <a:ln w="57150">
-            <a:solidFill>
-              <a:schemeClr val="accent6"/>
-            </a:solidFill>
-          </a:ln>
-        </p:spPr>
-        <p:style>
-          <a:lnRef idx="1">
-            <a:schemeClr val="accent1"/>
-          </a:lnRef>
-          <a:fillRef idx="0">
-            <a:schemeClr val="accent1"/>
-          </a:fillRef>
-          <a:effectRef idx="0">
-            <a:schemeClr val="accent1"/>
-          </a:effectRef>
-          <a:fontRef idx="minor">
-            <a:schemeClr val="tx1"/>
-          </a:fontRef>
-        </p:style>
-      </p:cxnSp>
-      <p:sp>
-        <p:nvSpPr>
-          <p:cNvPr id="12" name="TextBox 11"/>
-          <p:cNvSpPr txBox="1"/>
-          <p:nvPr userDrawn="1"/>
-        </p:nvSpPr>
-        <p:spPr>
-          <a:xfrm>
-            <a:off x="2604393" y="1232607"/>
-            <a:ext cx="1843280" cy="246221"/>
-          </a:xfrm>
-          <a:prstGeom prst="rect">
-            <a:avLst/>
-          </a:prstGeom>
-          <a:noFill/>
-        </p:spPr>
-        <p:txBody>
-          <a:bodyPr wrap="square" rtlCol="0">
-            <a:spAutoFit/>
-          </a:bodyPr>
-          <a:lstStyle/>
-          <a:p>
-            <a:pPr algn="ctr"/>
-            <a:r>
-              <a:rPr lang="en-US" sz="1000" spc="160" dirty="0">
-                <a:solidFill>
-                  <a:schemeClr val="accent3">
-                    <a:lumMod val="60000"/>
-                    <a:lumOff val="40000"/>
-                  </a:schemeClr>
-                </a:solidFill>
-                <a:latin typeface="Noto Sans" charset="0"/>
-                <a:ea typeface="Noto Sans" charset="0"/>
-                <a:cs typeface="Noto Sans" charset="0"/>
-              </a:rPr>
-              <a:t>ABOUT</a:t>
-            </a:r>
-            <a:r>
-              <a:rPr lang="en-US" sz="1000" spc="160" baseline="0" dirty="0">
-                <a:solidFill>
-                  <a:schemeClr val="accent3">
-                    <a:lumMod val="60000"/>
-                    <a:lumOff val="40000"/>
-                  </a:schemeClr>
-                </a:solidFill>
-                <a:latin typeface="Noto Sans" charset="0"/>
-                <a:ea typeface="Noto Sans" charset="0"/>
-                <a:cs typeface="Noto Sans" charset="0"/>
-              </a:rPr>
-              <a:t> US</a:t>
-            </a:r>
-            <a:endParaRPr lang="en-US" sz="1000" spc="160" dirty="0">
-              <a:solidFill>
-                <a:schemeClr val="accent3">
-                  <a:lumMod val="60000"/>
-                  <a:lumOff val="40000"/>
-                </a:schemeClr>
-              </a:solidFill>
-              <a:latin typeface="Noto Sans" charset="0"/>
-              <a:ea typeface="Noto Sans" charset="0"/>
-              <a:cs typeface="Noto Sans" charset="0"/>
-            </a:endParaRPr>
-          </a:p>
-        </p:txBody>
-      </p:sp>
-      <p:sp>
-        <p:nvSpPr>
-          <p:cNvPr id="13" name="TextBox 12"/>
-          <p:cNvSpPr txBox="1"/>
-          <p:nvPr userDrawn="1"/>
-        </p:nvSpPr>
-        <p:spPr>
-          <a:xfrm>
-            <a:off x="4583588" y="1232607"/>
-            <a:ext cx="1843280" cy="246221"/>
-          </a:xfrm>
-          <a:prstGeom prst="rect">
-            <a:avLst/>
-          </a:prstGeom>
-          <a:noFill/>
-        </p:spPr>
-        <p:txBody>
-          <a:bodyPr wrap="square" rtlCol="0">
-            <a:spAutoFit/>
-          </a:bodyPr>
-          <a:lstStyle/>
-          <a:p>
-            <a:pPr algn="ctr"/>
-            <a:r>
-              <a:rPr lang="en-US" sz="1000" spc="160" dirty="0">
-                <a:solidFill>
-                  <a:schemeClr val="accent3">
-                    <a:lumMod val="60000"/>
-                    <a:lumOff val="40000"/>
-                  </a:schemeClr>
-                </a:solidFill>
-                <a:latin typeface="Noto Sans" charset="0"/>
-                <a:ea typeface="Noto Sans" charset="0"/>
-                <a:cs typeface="Noto Sans" charset="0"/>
-              </a:rPr>
-              <a:t>INFOGRAPHICS</a:t>
-            </a:r>
-          </a:p>
-        </p:txBody>
-      </p:sp>
-      <p:sp>
-        <p:nvSpPr>
-          <p:cNvPr id="14" name="TextBox 13"/>
-          <p:cNvSpPr txBox="1"/>
-          <p:nvPr userDrawn="1"/>
-        </p:nvSpPr>
-        <p:spPr>
-          <a:xfrm>
-            <a:off x="6562782" y="1232607"/>
-            <a:ext cx="1843280" cy="246221"/>
-          </a:xfrm>
-          <a:prstGeom prst="rect">
-            <a:avLst/>
-          </a:prstGeom>
-          <a:noFill/>
-        </p:spPr>
-        <p:txBody>
-          <a:bodyPr wrap="square" rtlCol="0">
-            <a:spAutoFit/>
-          </a:bodyPr>
-          <a:lstStyle/>
-          <a:p>
-            <a:pPr algn="ctr"/>
-            <a:r>
-              <a:rPr lang="en-US" sz="1000" spc="160" dirty="0">
-                <a:solidFill>
-                  <a:schemeClr val="accent3">
-                    <a:lumMod val="60000"/>
-                    <a:lumOff val="40000"/>
-                  </a:schemeClr>
-                </a:solidFill>
-                <a:latin typeface="Noto Sans" charset="0"/>
-                <a:ea typeface="Noto Sans" charset="0"/>
-                <a:cs typeface="Noto Sans" charset="0"/>
-              </a:rPr>
-              <a:t>CONTACT</a:t>
-            </a:r>
-          </a:p>
-        </p:txBody>
-      </p:sp>
-      <p:sp>
-        <p:nvSpPr>
-          <p:cNvPr id="10" name="Slide Number Placeholder 5"/>
-          <p:cNvSpPr>
-            <a:spLocks noGrp="1"/>
-          </p:cNvSpPr>
-          <p:nvPr>
-            <p:ph type="sldNum" sz="quarter" idx="4"/>
-          </p:nvPr>
-        </p:nvSpPr>
-        <p:spPr>
-          <a:xfrm>
-            <a:off x="10919018" y="1346518"/>
-            <a:ext cx="725296" cy="365125"/>
-          </a:xfrm>
-          <a:prstGeom prst="rect">
-            <a:avLst/>
-          </a:prstGeom>
-        </p:spPr>
-        <p:txBody>
-          <a:bodyPr anchor="ctr"/>
-          <a:lstStyle>
-            <a:lvl1pPr algn="ctr">
-              <a:defRPr sz="1600" b="0" i="0">
-                <a:solidFill>
-                  <a:schemeClr val="bg1"/>
-                </a:solidFill>
-                <a:latin typeface="Roboto Light" charset="0"/>
-                <a:ea typeface="Roboto Light" charset="0"/>
-                <a:cs typeface="Roboto Light" charset="0"/>
-              </a:defRPr>
-            </a:lvl1pPr>
-          </a:lstStyle>
-          <a:p>
-            <a:fld id="{936C95AE-7298-45E1-9514-94AFF5BED89B}" type="slidenum">
-              <a:rPr lang="en-US" smtClean="0"/>
-              <a:pPr/>
-              <a:t>‹N°›</a:t>
-            </a:fld>
-            <a:endParaRPr lang="en-US" dirty="0"/>
-          </a:p>
-        </p:txBody>
-      </p:sp>
-    </p:spTree>
-    <p:extLst>
-      <p:ext uri="{BB962C8B-B14F-4D97-AF65-F5344CB8AC3E}">
-        <p14:creationId xmlns:p14="http://schemas.microsoft.com/office/powerpoint/2010/main" val="965528816"/>
       </p:ext>
     </p:extLst>
   </p:cSld>
@@ -6992,6 +6993,361 @@
 
 <file path=ppt/slideLayouts/slideLayout30.xml><?xml version="1.0" encoding="utf-8"?>
 <p:sldLayout xmlns:a="http://schemas.openxmlformats.org/drawingml/2006/main" xmlns:r="http://schemas.openxmlformats.org/officeDocument/2006/relationships" xmlns:p="http://schemas.openxmlformats.org/presentationml/2006/main" preserve="1" userDrawn="1">
+  <p:cSld name="Title + Section 1">
+    <p:bg>
+      <p:bgRef idx="1001">
+        <a:schemeClr val="bg1"/>
+      </p:bgRef>
+    </p:bg>
+    <p:spTree>
+      <p:nvGrpSpPr>
+        <p:cNvPr id="1" name=""/>
+        <p:cNvGrpSpPr/>
+        <p:nvPr/>
+      </p:nvGrpSpPr>
+      <p:grpSpPr>
+        <a:xfrm>
+          <a:off x="0" y="0"/>
+          <a:ext cx="0" cy="0"/>
+          <a:chOff x="0" y="0"/>
+          <a:chExt cx="0" cy="0"/>
+        </a:xfrm>
+      </p:grpSpPr>
+      <p:sp>
+        <p:nvSpPr>
+          <p:cNvPr id="8" name="Title 1"/>
+          <p:cNvSpPr>
+            <a:spLocks noGrp="1"/>
+          </p:cNvSpPr>
+          <p:nvPr>
+            <p:ph type="title"/>
+          </p:nvPr>
+        </p:nvSpPr>
+        <p:spPr>
+          <a:xfrm>
+            <a:off x="526941" y="573317"/>
+            <a:ext cx="11230421" cy="431020"/>
+          </a:xfrm>
+          <a:prstGeom prst="rect">
+            <a:avLst/>
+          </a:prstGeom>
+        </p:spPr>
+        <p:txBody>
+          <a:bodyPr/>
+          <a:lstStyle>
+            <a:lvl1pPr algn="l">
+              <a:defRPr sz="2400" b="0" i="0">
+                <a:solidFill>
+                  <a:schemeClr val="bg1"/>
+                </a:solidFill>
+                <a:latin typeface="Roboto Medium" charset="0"/>
+                <a:ea typeface="Roboto Medium" charset="0"/>
+                <a:cs typeface="Roboto Medium" charset="0"/>
+              </a:defRPr>
+            </a:lvl1pPr>
+          </a:lstStyle>
+          <a:p>
+            <a:r>
+              <a:rPr lang="en-US" dirty="0"/>
+              <a:t>Click to edit Master title style</a:t>
+            </a:r>
+          </a:p>
+        </p:txBody>
+      </p:sp>
+      <p:sp>
+        <p:nvSpPr>
+          <p:cNvPr id="2" name="TextBox 1"/>
+          <p:cNvSpPr txBox="1"/>
+          <p:nvPr userDrawn="1"/>
+        </p:nvSpPr>
+        <p:spPr>
+          <a:xfrm>
+            <a:off x="526941" y="1232607"/>
+            <a:ext cx="1843280" cy="246221"/>
+          </a:xfrm>
+          <a:prstGeom prst="rect">
+            <a:avLst/>
+          </a:prstGeom>
+          <a:noFill/>
+        </p:spPr>
+        <p:txBody>
+          <a:bodyPr wrap="square" rtlCol="0">
+            <a:spAutoFit/>
+          </a:bodyPr>
+          <a:lstStyle/>
+          <a:p>
+            <a:pPr algn="ctr"/>
+            <a:r>
+              <a:rPr lang="en-US" sz="1000" spc="160" dirty="0">
+                <a:solidFill>
+                  <a:schemeClr val="bg1"/>
+                </a:solidFill>
+                <a:latin typeface="Noto Sans" charset="0"/>
+                <a:ea typeface="Noto Sans" charset="0"/>
+                <a:cs typeface="Noto Sans" charset="0"/>
+              </a:rPr>
+              <a:t>OUR</a:t>
+            </a:r>
+            <a:r>
+              <a:rPr lang="en-US" sz="1000" spc="160" baseline="0" dirty="0">
+                <a:solidFill>
+                  <a:schemeClr val="bg1"/>
+                </a:solidFill>
+                <a:latin typeface="Noto Sans" charset="0"/>
+                <a:ea typeface="Noto Sans" charset="0"/>
+                <a:cs typeface="Noto Sans" charset="0"/>
+              </a:rPr>
+              <a:t> COMPANY</a:t>
+            </a:r>
+            <a:endParaRPr lang="en-US" sz="1000" spc="160" dirty="0">
+              <a:solidFill>
+                <a:schemeClr val="bg1"/>
+              </a:solidFill>
+              <a:latin typeface="Noto Sans" charset="0"/>
+              <a:ea typeface="Noto Sans" charset="0"/>
+              <a:cs typeface="Noto Sans" charset="0"/>
+            </a:endParaRPr>
+          </a:p>
+        </p:txBody>
+      </p:sp>
+      <p:cxnSp>
+        <p:nvCxnSpPr>
+          <p:cNvPr id="6" name="Straight Connector 5"/>
+          <p:cNvCxnSpPr/>
+          <p:nvPr userDrawn="1"/>
+        </p:nvCxnSpPr>
+        <p:spPr>
+          <a:xfrm>
+            <a:off x="526941" y="1602414"/>
+            <a:ext cx="1843280" cy="0"/>
+          </a:xfrm>
+          <a:prstGeom prst="line">
+            <a:avLst/>
+          </a:prstGeom>
+          <a:ln w="57150">
+            <a:solidFill>
+              <a:schemeClr val="accent6"/>
+            </a:solidFill>
+          </a:ln>
+        </p:spPr>
+        <p:style>
+          <a:lnRef idx="1">
+            <a:schemeClr val="accent1"/>
+          </a:lnRef>
+          <a:fillRef idx="0">
+            <a:schemeClr val="accent1"/>
+          </a:fillRef>
+          <a:effectRef idx="0">
+            <a:schemeClr val="accent1"/>
+          </a:effectRef>
+          <a:fontRef idx="minor">
+            <a:schemeClr val="tx1"/>
+          </a:fontRef>
+        </p:style>
+      </p:cxnSp>
+      <p:sp>
+        <p:nvSpPr>
+          <p:cNvPr id="12" name="TextBox 11"/>
+          <p:cNvSpPr txBox="1"/>
+          <p:nvPr userDrawn="1"/>
+        </p:nvSpPr>
+        <p:spPr>
+          <a:xfrm>
+            <a:off x="2604393" y="1232607"/>
+            <a:ext cx="1843280" cy="246221"/>
+          </a:xfrm>
+          <a:prstGeom prst="rect">
+            <a:avLst/>
+          </a:prstGeom>
+          <a:noFill/>
+        </p:spPr>
+        <p:txBody>
+          <a:bodyPr wrap="square" rtlCol="0">
+            <a:spAutoFit/>
+          </a:bodyPr>
+          <a:lstStyle/>
+          <a:p>
+            <a:pPr algn="ctr"/>
+            <a:r>
+              <a:rPr lang="en-US" sz="1000" spc="160" dirty="0">
+                <a:solidFill>
+                  <a:schemeClr val="accent3">
+                    <a:lumMod val="60000"/>
+                    <a:lumOff val="40000"/>
+                  </a:schemeClr>
+                </a:solidFill>
+                <a:latin typeface="Noto Sans" charset="0"/>
+                <a:ea typeface="Noto Sans" charset="0"/>
+                <a:cs typeface="Noto Sans" charset="0"/>
+              </a:rPr>
+              <a:t>ABOUT</a:t>
+            </a:r>
+            <a:r>
+              <a:rPr lang="en-US" sz="1000" spc="160" baseline="0" dirty="0">
+                <a:solidFill>
+                  <a:schemeClr val="accent3">
+                    <a:lumMod val="60000"/>
+                    <a:lumOff val="40000"/>
+                  </a:schemeClr>
+                </a:solidFill>
+                <a:latin typeface="Noto Sans" charset="0"/>
+                <a:ea typeface="Noto Sans" charset="0"/>
+                <a:cs typeface="Noto Sans" charset="0"/>
+              </a:rPr>
+              <a:t> US</a:t>
+            </a:r>
+            <a:endParaRPr lang="en-US" sz="1000" spc="160" dirty="0">
+              <a:solidFill>
+                <a:schemeClr val="accent3">
+                  <a:lumMod val="60000"/>
+                  <a:lumOff val="40000"/>
+                </a:schemeClr>
+              </a:solidFill>
+              <a:latin typeface="Noto Sans" charset="0"/>
+              <a:ea typeface="Noto Sans" charset="0"/>
+              <a:cs typeface="Noto Sans" charset="0"/>
+            </a:endParaRPr>
+          </a:p>
+        </p:txBody>
+      </p:sp>
+      <p:sp>
+        <p:nvSpPr>
+          <p:cNvPr id="13" name="TextBox 12"/>
+          <p:cNvSpPr txBox="1"/>
+          <p:nvPr userDrawn="1"/>
+        </p:nvSpPr>
+        <p:spPr>
+          <a:xfrm>
+            <a:off x="4583588" y="1232607"/>
+            <a:ext cx="1843280" cy="246221"/>
+          </a:xfrm>
+          <a:prstGeom prst="rect">
+            <a:avLst/>
+          </a:prstGeom>
+          <a:noFill/>
+        </p:spPr>
+        <p:txBody>
+          <a:bodyPr wrap="square" rtlCol="0">
+            <a:spAutoFit/>
+          </a:bodyPr>
+          <a:lstStyle/>
+          <a:p>
+            <a:pPr algn="ctr"/>
+            <a:r>
+              <a:rPr lang="en-US" sz="1000" spc="160" dirty="0">
+                <a:solidFill>
+                  <a:schemeClr val="accent3">
+                    <a:lumMod val="60000"/>
+                    <a:lumOff val="40000"/>
+                  </a:schemeClr>
+                </a:solidFill>
+                <a:latin typeface="Noto Sans" charset="0"/>
+                <a:ea typeface="Noto Sans" charset="0"/>
+                <a:cs typeface="Noto Sans" charset="0"/>
+              </a:rPr>
+              <a:t>INFOGRAPHICS</a:t>
+            </a:r>
+          </a:p>
+        </p:txBody>
+      </p:sp>
+      <p:sp>
+        <p:nvSpPr>
+          <p:cNvPr id="14" name="TextBox 13"/>
+          <p:cNvSpPr txBox="1"/>
+          <p:nvPr userDrawn="1"/>
+        </p:nvSpPr>
+        <p:spPr>
+          <a:xfrm>
+            <a:off x="6562782" y="1232607"/>
+            <a:ext cx="1843280" cy="246221"/>
+          </a:xfrm>
+          <a:prstGeom prst="rect">
+            <a:avLst/>
+          </a:prstGeom>
+          <a:noFill/>
+        </p:spPr>
+        <p:txBody>
+          <a:bodyPr wrap="square" rtlCol="0">
+            <a:spAutoFit/>
+          </a:bodyPr>
+          <a:lstStyle/>
+          <a:p>
+            <a:pPr algn="ctr"/>
+            <a:r>
+              <a:rPr lang="en-US" sz="1000" spc="160" dirty="0">
+                <a:solidFill>
+                  <a:schemeClr val="accent3">
+                    <a:lumMod val="60000"/>
+                    <a:lumOff val="40000"/>
+                  </a:schemeClr>
+                </a:solidFill>
+                <a:latin typeface="Noto Sans" charset="0"/>
+                <a:ea typeface="Noto Sans" charset="0"/>
+                <a:cs typeface="Noto Sans" charset="0"/>
+              </a:rPr>
+              <a:t>CONTACT</a:t>
+            </a:r>
+          </a:p>
+        </p:txBody>
+      </p:sp>
+      <p:sp>
+        <p:nvSpPr>
+          <p:cNvPr id="10" name="Slide Number Placeholder 5"/>
+          <p:cNvSpPr>
+            <a:spLocks noGrp="1"/>
+          </p:cNvSpPr>
+          <p:nvPr>
+            <p:ph type="sldNum" sz="quarter" idx="4"/>
+          </p:nvPr>
+        </p:nvSpPr>
+        <p:spPr>
+          <a:xfrm>
+            <a:off x="10919018" y="1346518"/>
+            <a:ext cx="725296" cy="365125"/>
+          </a:xfrm>
+          <a:prstGeom prst="rect">
+            <a:avLst/>
+          </a:prstGeom>
+        </p:spPr>
+        <p:txBody>
+          <a:bodyPr anchor="ctr"/>
+          <a:lstStyle>
+            <a:lvl1pPr algn="ctr">
+              <a:defRPr sz="1600" b="0" i="0">
+                <a:solidFill>
+                  <a:schemeClr val="bg1"/>
+                </a:solidFill>
+                <a:latin typeface="Roboto Light" charset="0"/>
+                <a:ea typeface="Roboto Light" charset="0"/>
+                <a:cs typeface="Roboto Light" charset="0"/>
+              </a:defRPr>
+            </a:lvl1pPr>
+          </a:lstStyle>
+          <a:p>
+            <a:fld id="{936C95AE-7298-45E1-9514-94AFF5BED89B}" type="slidenum">
+              <a:rPr lang="en-US" smtClean="0"/>
+              <a:pPr/>
+              <a:t>‹N°›</a:t>
+            </a:fld>
+            <a:endParaRPr lang="en-US" dirty="0"/>
+          </a:p>
+        </p:txBody>
+      </p:sp>
+    </p:spTree>
+    <p:extLst>
+      <p:ext uri="{BB962C8B-B14F-4D97-AF65-F5344CB8AC3E}">
+        <p14:creationId xmlns:p14="http://schemas.microsoft.com/office/powerpoint/2010/main" val="965528816"/>
+      </p:ext>
+    </p:extLst>
+  </p:cSld>
+  <p:clrMapOvr>
+    <a:overrideClrMapping bg1="lt1" tx1="dk1" bg2="lt2" tx2="dk2" accent1="accent1" accent2="accent2" accent3="accent3" accent4="accent4" accent5="accent5" accent6="accent6" hlink="hlink" folHlink="folHlink"/>
+  </p:clrMapOvr>
+</p:sldLayout>
+</file>
+
+<file path=ppt/slideLayouts/slideLayout31.xml><?xml version="1.0" encoding="utf-8"?>
+<p:sldLayout xmlns:a="http://schemas.openxmlformats.org/drawingml/2006/main" xmlns:r="http://schemas.openxmlformats.org/officeDocument/2006/relationships" xmlns:p="http://schemas.openxmlformats.org/presentationml/2006/main" preserve="1" userDrawn="1">
   <p:cSld name="Title + Section 2">
     <p:bg>
       <p:bgRef idx="1001">
@@ -7336,7 +7692,7 @@
 </p:sldLayout>
 </file>
 
-<file path=ppt/slideLayouts/slideLayout31.xml><?xml version="1.0" encoding="utf-8"?>
+<file path=ppt/slideLayouts/slideLayout32.xml><?xml version="1.0" encoding="utf-8"?>
 <p:sldLayout xmlns:a="http://schemas.openxmlformats.org/drawingml/2006/main" xmlns:r="http://schemas.openxmlformats.org/officeDocument/2006/relationships" xmlns:p="http://schemas.openxmlformats.org/presentationml/2006/main" preserve="1" userDrawn="1">
   <p:cSld name="Title + Section 3">
     <p:bg>
@@ -7672,7 +8028,7 @@
 </p:sldLayout>
 </file>
 
-<file path=ppt/slideLayouts/slideLayout32.xml><?xml version="1.0" encoding="utf-8"?>
+<file path=ppt/slideLayouts/slideLayout33.xml><?xml version="1.0" encoding="utf-8"?>
 <p:sldLayout xmlns:a="http://schemas.openxmlformats.org/drawingml/2006/main" xmlns:r="http://schemas.openxmlformats.org/officeDocument/2006/relationships" xmlns:p="http://schemas.openxmlformats.org/presentationml/2006/main" preserve="1" userDrawn="1">
   <p:cSld name="Title + Section 4">
     <p:bg>
@@ -9836,6 +10192,7 @@
     <p:sldLayoutId id="2147483659" r:id="rId11"/>
     <p:sldLayoutId id="2147483663" r:id="rId12"/>
     <p:sldLayoutId id="2147483671" r:id="rId13"/>
+    <p:sldLayoutId id="2147483685" r:id="rId14"/>
   </p:sldLayoutIdLst>
   <p:txStyles>
     <p:titleStyle>
@@ -10685,8 +11042,33 @@
                 <a:ea typeface="Roboto Light" charset="0"/>
                 <a:cs typeface="Roboto Light" charset="0"/>
               </a:rPr>
-              <a:t> Helena</a:t>
-            </a:r>
+              <a:t> </a:t>
+            </a:r>
+            <a:r>
+              <a:rPr lang="en-US" sz="1200" b="0" i="0" dirty="0" err="1">
+                <a:solidFill>
+                  <a:schemeClr val="accent3">
+                    <a:lumMod val="40000"/>
+                    <a:lumOff val="60000"/>
+                  </a:schemeClr>
+                </a:solidFill>
+                <a:latin typeface="Roboto Light" charset="0"/>
+                <a:ea typeface="Roboto Light" charset="0"/>
+                <a:cs typeface="Roboto Light" charset="0"/>
+              </a:rPr>
+              <a:t>Héléna</a:t>
+            </a:r>
+            <a:endParaRPr lang="en-US" sz="1200" b="0" i="0" dirty="0">
+              <a:solidFill>
+                <a:schemeClr val="accent3">
+                  <a:lumMod val="40000"/>
+                  <a:lumOff val="60000"/>
+                </a:schemeClr>
+              </a:solidFill>
+              <a:latin typeface="Roboto Light" charset="0"/>
+              <a:ea typeface="Roboto Light" charset="0"/>
+              <a:cs typeface="Roboto Light" charset="0"/>
+            </a:endParaRPr>
           </a:p>
         </p:txBody>
       </p:sp>
@@ -15038,12 +15420,12 @@
           </a:ln>
           <a:extLst>
             <a:ext uri="{909E8E84-426E-40dd-AFC4-6F175D3DCCD1}">
-              <a14:hiddenFill xmlns:a14="http://schemas.microsoft.com/office/drawing/2010/main" xmlns="">
+              <a14:hiddenFill xmlns="" xmlns:a14="http://schemas.microsoft.com/office/drawing/2010/main">
                 <a:noFill/>
               </a14:hiddenFill>
             </a:ext>
             <a:ext uri="{91240B29-F687-4f45-9708-019B960494DF}">
-              <a14:hiddenLine xmlns:a14="http://schemas.microsoft.com/office/drawing/2010/main" xmlns="" w="9525">
+              <a14:hiddenLine xmlns="" xmlns:a14="http://schemas.microsoft.com/office/drawing/2010/main" w="9525">
                 <a:solidFill>
                   <a:srgbClr val="000000"/>
                 </a:solidFill>
@@ -15088,12 +15470,12 @@
           </a:ln>
           <a:extLst>
             <a:ext uri="{909E8E84-426E-40dd-AFC4-6F175D3DCCD1}">
-              <a14:hiddenFill xmlns:a14="http://schemas.microsoft.com/office/drawing/2010/main" xmlns="">
+              <a14:hiddenFill xmlns="" xmlns:a14="http://schemas.microsoft.com/office/drawing/2010/main">
                 <a:noFill/>
               </a14:hiddenFill>
             </a:ext>
             <a:ext uri="{91240B29-F687-4f45-9708-019B960494DF}">
-              <a14:hiddenLine xmlns:a14="http://schemas.microsoft.com/office/drawing/2010/main" xmlns="" w="9525">
+              <a14:hiddenLine xmlns="" xmlns:a14="http://schemas.microsoft.com/office/drawing/2010/main" w="9525">
                 <a:solidFill>
                   <a:srgbClr val="000000"/>
                 </a:solidFill>
@@ -20231,12 +20613,12 @@
           </a:ln>
           <a:extLst>
             <a:ext uri="{909E8E84-426E-40dd-AFC4-6F175D3DCCD1}">
-              <a14:hiddenFill xmlns:a14="http://schemas.microsoft.com/office/drawing/2010/main" xmlns="">
+              <a14:hiddenFill xmlns="" xmlns:a14="http://schemas.microsoft.com/office/drawing/2010/main">
                 <a:noFill/>
               </a14:hiddenFill>
             </a:ext>
             <a:ext uri="{91240B29-F687-4f45-9708-019B960494DF}">
-              <a14:hiddenLine xmlns:a14="http://schemas.microsoft.com/office/drawing/2010/main" xmlns="" w="9525">
+              <a14:hiddenLine xmlns="" xmlns:a14="http://schemas.microsoft.com/office/drawing/2010/main" w="9525">
                 <a:solidFill>
                   <a:srgbClr val="000000"/>
                 </a:solidFill>
@@ -20281,12 +20663,12 @@
           </a:ln>
           <a:extLst>
             <a:ext uri="{909E8E84-426E-40dd-AFC4-6F175D3DCCD1}">
-              <a14:hiddenFill xmlns:a14="http://schemas.microsoft.com/office/drawing/2010/main" xmlns="">
+              <a14:hiddenFill xmlns="" xmlns:a14="http://schemas.microsoft.com/office/drawing/2010/main">
                 <a:noFill/>
               </a14:hiddenFill>
             </a:ext>
             <a:ext uri="{91240B29-F687-4f45-9708-019B960494DF}">
-              <a14:hiddenLine xmlns:a14="http://schemas.microsoft.com/office/drawing/2010/main" xmlns="" w="9525">
+              <a14:hiddenLine xmlns="" xmlns:a14="http://schemas.microsoft.com/office/drawing/2010/main" w="9525">
                 <a:solidFill>
                   <a:srgbClr val="000000"/>
                 </a:solidFill>
@@ -20750,6 +21132,151 @@
       </p:grpSpPr>
       <p:sp>
         <p:nvSpPr>
+          <p:cNvPr id="2" name="Title 1"/>
+          <p:cNvSpPr>
+            <a:spLocks noGrp="1"/>
+          </p:cNvSpPr>
+          <p:nvPr>
+            <p:ph type="title"/>
+          </p:nvPr>
+        </p:nvSpPr>
+        <p:spPr/>
+        <p:txBody>
+          <a:bodyPr/>
+          <a:lstStyle/>
+          <a:p>
+            <a:r>
+              <a:rPr lang="en-US" dirty="0"/>
+              <a:t>Burnup du </a:t>
+            </a:r>
+            <a:r>
+              <a:rPr lang="en-US" dirty="0" err="1"/>
+              <a:t>projet</a:t>
+            </a:r>
+            <a:endParaRPr lang="en-US" dirty="0"/>
+          </a:p>
+        </p:txBody>
+      </p:sp>
+      <p:sp>
+        <p:nvSpPr>
+          <p:cNvPr id="5" name="Espace réservé du texte 4">
+            <a:extLst>
+              <a:ext uri="{FF2B5EF4-FFF2-40B4-BE49-F238E27FC236}">
+                <a16:creationId xmlns:a16="http://schemas.microsoft.com/office/drawing/2014/main" id="{50C55174-CDBD-4CA6-B6ED-31DD59F16D4F}"/>
+              </a:ext>
+            </a:extLst>
+          </p:cNvPr>
+          <p:cNvSpPr>
+            <a:spLocks noGrp="1"/>
+          </p:cNvSpPr>
+          <p:nvPr>
+            <p:ph type="body" sz="quarter" idx="13"/>
+          </p:nvPr>
+        </p:nvSpPr>
+        <p:spPr/>
+        <p:txBody>
+          <a:bodyPr/>
+          <a:lstStyle/>
+          <a:p>
+            <a:endParaRPr lang="fr-CH"/>
+          </a:p>
+        </p:txBody>
+      </p:sp>
+      <p:sp>
+        <p:nvSpPr>
+          <p:cNvPr id="3" name="Slide Number Placeholder 2"/>
+          <p:cNvSpPr>
+            <a:spLocks noGrp="1"/>
+          </p:cNvSpPr>
+          <p:nvPr>
+            <p:ph type="sldNum" sz="quarter" idx="4"/>
+          </p:nvPr>
+        </p:nvSpPr>
+        <p:spPr/>
+        <p:txBody>
+          <a:bodyPr/>
+          <a:lstStyle/>
+          <a:p>
+            <a:fld id="{D60D1EDE-7116-2443-9BDD-368CE5B37660}" type="slidenum">
+              <a:rPr lang="en-US" smtClean="0"/>
+              <a:pPr/>
+              <a:t>18</a:t>
+            </a:fld>
+            <a:endParaRPr lang="en-US" dirty="0"/>
+          </a:p>
+        </p:txBody>
+      </p:sp>
+      <p:pic>
+        <p:nvPicPr>
+          <p:cNvPr id="7" name="Image 6" descr="Une image contenant carte, texte, ciel, eau&#10;&#10;Description générée avec un niveau de confiance très élevé">
+            <a:extLst>
+              <a:ext uri="{FF2B5EF4-FFF2-40B4-BE49-F238E27FC236}">
+                <a16:creationId xmlns:a16="http://schemas.microsoft.com/office/drawing/2014/main" id="{31203BB9-9D08-4CB3-B35A-532591635ADA}"/>
+              </a:ext>
+            </a:extLst>
+          </p:cNvPr>
+          <p:cNvPicPr>
+            <a:picLocks noChangeAspect="1"/>
+          </p:cNvPicPr>
+          <p:nvPr/>
+        </p:nvPicPr>
+        <p:blipFill>
+          <a:blip r:embed="rId2">
+            <a:extLst>
+              <a:ext uri="{28A0092B-C50C-407E-A947-70E740481C1C}">
+                <a14:useLocalDpi xmlns:a14="http://schemas.microsoft.com/office/drawing/2010/main" val="0"/>
+              </a:ext>
+            </a:extLst>
+          </a:blip>
+          <a:stretch>
+            <a:fillRect/>
+          </a:stretch>
+        </p:blipFill>
+        <p:spPr>
+          <a:xfrm>
+            <a:off x="1313769" y="1711643"/>
+            <a:ext cx="9564461" cy="5021342"/>
+          </a:xfrm>
+          <a:prstGeom prst="rect">
+            <a:avLst/>
+          </a:prstGeom>
+        </p:spPr>
+      </p:pic>
+    </p:spTree>
+    <p:extLst>
+      <p:ext uri="{BB962C8B-B14F-4D97-AF65-F5344CB8AC3E}">
+        <p14:creationId xmlns:p14="http://schemas.microsoft.com/office/powerpoint/2010/main" val="838139053"/>
+      </p:ext>
+    </p:extLst>
+  </p:cSld>
+  <p:clrMapOvr>
+    <a:masterClrMapping/>
+  </p:clrMapOvr>
+  <p:transition spd="slow">
+    <p:push dir="u"/>
+  </p:transition>
+</p:sld>
+</file>
+
+<file path=ppt/slides/slide19.xml><?xml version="1.0" encoding="utf-8"?>
+<p:sld xmlns:a="http://schemas.openxmlformats.org/drawingml/2006/main" xmlns:r="http://schemas.openxmlformats.org/officeDocument/2006/relationships" xmlns:p="http://schemas.openxmlformats.org/presentationml/2006/main">
+  <p:cSld>
+    <p:spTree>
+      <p:nvGrpSpPr>
+        <p:cNvPr id="1" name=""/>
+        <p:cNvGrpSpPr/>
+        <p:nvPr/>
+      </p:nvGrpSpPr>
+      <p:grpSpPr>
+        <a:xfrm>
+          <a:off x="0" y="0"/>
+          <a:ext cx="0" cy="0"/>
+          <a:chOff x="0" y="0"/>
+          <a:chExt cx="0" cy="0"/>
+        </a:xfrm>
+      </p:grpSpPr>
+      <p:sp>
+        <p:nvSpPr>
           <p:cNvPr id="4" name="Slide Number Placeholder 3"/>
           <p:cNvSpPr>
             <a:spLocks noGrp="1"/>
@@ -20771,7 +21298,7 @@
             <a:fld id="{936C95AE-7298-45E1-9514-94AFF5BED89B}" type="slidenum">
               <a:rPr lang="en-US" smtClean="0"/>
               <a:pPr/>
-              <a:t>18</a:t>
+              <a:t>19</a:t>
             </a:fld>
             <a:endParaRPr lang="en-US" dirty="0"/>
           </a:p>
@@ -22378,195 +22905,6 @@
 </p:sld>
 </file>
 
-<file path=ppt/slides/slide19.xml><?xml version="1.0" encoding="utf-8"?>
-<p:sld xmlns:a="http://schemas.openxmlformats.org/drawingml/2006/main" xmlns:r="http://schemas.openxmlformats.org/officeDocument/2006/relationships" xmlns:p="http://schemas.openxmlformats.org/presentationml/2006/main">
-  <p:cSld>
-    <p:spTree>
-      <p:nvGrpSpPr>
-        <p:cNvPr id="1" name=""/>
-        <p:cNvGrpSpPr/>
-        <p:nvPr/>
-      </p:nvGrpSpPr>
-      <p:grpSpPr>
-        <a:xfrm>
-          <a:off x="0" y="0"/>
-          <a:ext cx="0" cy="0"/>
-          <a:chOff x="0" y="0"/>
-          <a:chExt cx="0" cy="0"/>
-        </a:xfrm>
-      </p:grpSpPr>
-      <p:sp>
-        <p:nvSpPr>
-          <p:cNvPr id="35" name="Rectangle 34"/>
-          <p:cNvSpPr/>
-          <p:nvPr/>
-        </p:nvSpPr>
-        <p:spPr>
-          <a:xfrm>
-            <a:off x="1281467" y="3685575"/>
-            <a:ext cx="9629068" cy="2137268"/>
-          </a:xfrm>
-          <a:prstGeom prst="rect">
-            <a:avLst/>
-          </a:prstGeom>
-          <a:noFill/>
-          <a:ln w="6350" cmpd="sng">
-            <a:noFill/>
-          </a:ln>
-          <a:effectLst/>
-        </p:spPr>
-        <p:style>
-          <a:lnRef idx="1">
-            <a:schemeClr val="accent1"/>
-          </a:lnRef>
-          <a:fillRef idx="3">
-            <a:schemeClr val="accent1"/>
-          </a:fillRef>
-          <a:effectRef idx="2">
-            <a:schemeClr val="accent1"/>
-          </a:effectRef>
-          <a:fontRef idx="minor">
-            <a:schemeClr val="lt1"/>
-          </a:fontRef>
-        </p:style>
-        <p:txBody>
-          <a:bodyPr rtlCol="0" anchor="ctr"/>
-          <a:lstStyle/>
-          <a:p>
-            <a:pPr algn="ctr"/>
-            <a:r>
-              <a:rPr lang="en-US" sz="2400" dirty="0">
-                <a:solidFill>
-                  <a:schemeClr val="tx1"/>
-                </a:solidFill>
-                <a:latin typeface="Roboto Light" charset="0"/>
-                <a:ea typeface="Roboto Light" charset="0"/>
-                <a:cs typeface="Roboto Light" charset="0"/>
-              </a:rPr>
-              <a:t>Questions ?</a:t>
-            </a:r>
-          </a:p>
-        </p:txBody>
-      </p:sp>
-      <p:sp>
-        <p:nvSpPr>
-          <p:cNvPr id="2" name="Slide Number Placeholder 1"/>
-          <p:cNvSpPr>
-            <a:spLocks noGrp="1"/>
-          </p:cNvSpPr>
-          <p:nvPr>
-            <p:ph type="sldNum" sz="quarter" idx="4"/>
-          </p:nvPr>
-        </p:nvSpPr>
-        <p:spPr/>
-        <p:txBody>
-          <a:bodyPr/>
-          <a:lstStyle/>
-          <a:p>
-            <a:fld id="{936C95AE-7298-45E1-9514-94AFF5BED89B}" type="slidenum">
-              <a:rPr lang="en-US" smtClean="0"/>
-              <a:pPr/>
-              <a:t>19</a:t>
-            </a:fld>
-            <a:endParaRPr lang="en-US" dirty="0"/>
-          </a:p>
-        </p:txBody>
-      </p:sp>
-      <p:pic>
-        <p:nvPicPr>
-          <p:cNvPr id="24" name="Image 23">
-            <a:extLst>
-              <a:ext uri="{FF2B5EF4-FFF2-40B4-BE49-F238E27FC236}">
-                <a16:creationId xmlns:a16="http://schemas.microsoft.com/office/drawing/2014/main" id="{0C74E6A6-F1E8-4DD5-8CCE-FB8EECD7E9A7}"/>
-              </a:ext>
-            </a:extLst>
-          </p:cNvPr>
-          <p:cNvPicPr>
-            <a:picLocks noChangeAspect="1"/>
-          </p:cNvPicPr>
-          <p:nvPr/>
-        </p:nvPicPr>
-        <p:blipFill>
-          <a:blip r:embed="rId3"/>
-          <a:stretch>
-            <a:fillRect/>
-          </a:stretch>
-        </p:blipFill>
-        <p:spPr>
-          <a:xfrm>
-            <a:off x="4576043" y="679021"/>
-            <a:ext cx="3039914" cy="2749979"/>
-          </a:xfrm>
-          <a:prstGeom prst="rect">
-            <a:avLst/>
-          </a:prstGeom>
-        </p:spPr>
-      </p:pic>
-      <p:sp>
-        <p:nvSpPr>
-          <p:cNvPr id="4" name="ZoneTexte 3">
-            <a:extLst>
-              <a:ext uri="{FF2B5EF4-FFF2-40B4-BE49-F238E27FC236}">
-                <a16:creationId xmlns:a16="http://schemas.microsoft.com/office/drawing/2014/main" id="{E5BD4C69-0EBF-42EB-9712-849D3654344F}"/>
-              </a:ext>
-            </a:extLst>
-          </p:cNvPr>
-          <p:cNvSpPr txBox="1"/>
-          <p:nvPr/>
-        </p:nvSpPr>
-        <p:spPr>
-          <a:xfrm>
-            <a:off x="4657724" y="1981198"/>
-            <a:ext cx="2895601" cy="1352552"/>
-          </a:xfrm>
-          <a:prstGeom prst="rect">
-            <a:avLst/>
-          </a:prstGeom>
-          <a:solidFill>
-            <a:srgbClr val="E20613"/>
-          </a:solidFill>
-        </p:spPr>
-        <p:txBody>
-          <a:bodyPr wrap="square" rtlCol="0" anchor="ctr">
-            <a:noAutofit/>
-          </a:bodyPr>
-          <a:lstStyle/>
-          <a:p>
-            <a:pPr algn="ctr"/>
-            <a:r>
-              <a:rPr lang="fr-FR" sz="6000" dirty="0">
-                <a:solidFill>
-                  <a:schemeClr val="bg1"/>
-                </a:solidFill>
-                <a:latin typeface="Roboto Light"/>
-              </a:rPr>
-              <a:t>Merci !</a:t>
-            </a:r>
-            <a:endParaRPr lang="fr-CH" sz="6000" dirty="0">
-              <a:solidFill>
-                <a:schemeClr val="bg1"/>
-              </a:solidFill>
-              <a:latin typeface="Roboto Light"/>
-            </a:endParaRPr>
-          </a:p>
-        </p:txBody>
-      </p:sp>
-    </p:spTree>
-    <p:extLst>
-      <p:ext uri="{BB962C8B-B14F-4D97-AF65-F5344CB8AC3E}">
-        <p14:creationId xmlns:p14="http://schemas.microsoft.com/office/powerpoint/2010/main" val="6939507"/>
-      </p:ext>
-    </p:extLst>
-  </p:cSld>
-  <p:clrMapOvr>
-    <a:masterClrMapping/>
-  </p:clrMapOvr>
-  <p:transition spd="slow">
-    <p:push dir="u"/>
-  </p:transition>
-</p:sld>
-</file>
-
 <file path=ppt/slides/slide2.xml><?xml version="1.0" encoding="utf-8"?>
 <p:sld xmlns:a="http://schemas.openxmlformats.org/drawingml/2006/main" xmlns:r="http://schemas.openxmlformats.org/officeDocument/2006/relationships" xmlns:p="http://schemas.openxmlformats.org/presentationml/2006/main">
   <p:cSld>
@@ -24027,6 +24365,195 @@
 </p:sld>
 </file>
 
+<file path=ppt/slides/slide20.xml><?xml version="1.0" encoding="utf-8"?>
+<p:sld xmlns:a="http://schemas.openxmlformats.org/drawingml/2006/main" xmlns:r="http://schemas.openxmlformats.org/officeDocument/2006/relationships" xmlns:p="http://schemas.openxmlformats.org/presentationml/2006/main">
+  <p:cSld>
+    <p:spTree>
+      <p:nvGrpSpPr>
+        <p:cNvPr id="1" name=""/>
+        <p:cNvGrpSpPr/>
+        <p:nvPr/>
+      </p:nvGrpSpPr>
+      <p:grpSpPr>
+        <a:xfrm>
+          <a:off x="0" y="0"/>
+          <a:ext cx="0" cy="0"/>
+          <a:chOff x="0" y="0"/>
+          <a:chExt cx="0" cy="0"/>
+        </a:xfrm>
+      </p:grpSpPr>
+      <p:sp>
+        <p:nvSpPr>
+          <p:cNvPr id="35" name="Rectangle 34"/>
+          <p:cNvSpPr/>
+          <p:nvPr/>
+        </p:nvSpPr>
+        <p:spPr>
+          <a:xfrm>
+            <a:off x="1281467" y="3685575"/>
+            <a:ext cx="9629068" cy="2137268"/>
+          </a:xfrm>
+          <a:prstGeom prst="rect">
+            <a:avLst/>
+          </a:prstGeom>
+          <a:noFill/>
+          <a:ln w="6350" cmpd="sng">
+            <a:noFill/>
+          </a:ln>
+          <a:effectLst/>
+        </p:spPr>
+        <p:style>
+          <a:lnRef idx="1">
+            <a:schemeClr val="accent1"/>
+          </a:lnRef>
+          <a:fillRef idx="3">
+            <a:schemeClr val="accent1"/>
+          </a:fillRef>
+          <a:effectRef idx="2">
+            <a:schemeClr val="accent1"/>
+          </a:effectRef>
+          <a:fontRef idx="minor">
+            <a:schemeClr val="lt1"/>
+          </a:fontRef>
+        </p:style>
+        <p:txBody>
+          <a:bodyPr rtlCol="0" anchor="ctr"/>
+          <a:lstStyle/>
+          <a:p>
+            <a:pPr algn="ctr"/>
+            <a:r>
+              <a:rPr lang="en-US" sz="2400" dirty="0">
+                <a:solidFill>
+                  <a:schemeClr val="tx1"/>
+                </a:solidFill>
+                <a:latin typeface="Roboto Light" charset="0"/>
+                <a:ea typeface="Roboto Light" charset="0"/>
+                <a:cs typeface="Roboto Light" charset="0"/>
+              </a:rPr>
+              <a:t>Questions ?</a:t>
+            </a:r>
+          </a:p>
+        </p:txBody>
+      </p:sp>
+      <p:sp>
+        <p:nvSpPr>
+          <p:cNvPr id="2" name="Slide Number Placeholder 1"/>
+          <p:cNvSpPr>
+            <a:spLocks noGrp="1"/>
+          </p:cNvSpPr>
+          <p:nvPr>
+            <p:ph type="sldNum" sz="quarter" idx="4"/>
+          </p:nvPr>
+        </p:nvSpPr>
+        <p:spPr/>
+        <p:txBody>
+          <a:bodyPr/>
+          <a:lstStyle/>
+          <a:p>
+            <a:fld id="{936C95AE-7298-45E1-9514-94AFF5BED89B}" type="slidenum">
+              <a:rPr lang="en-US" smtClean="0"/>
+              <a:pPr/>
+              <a:t>20</a:t>
+            </a:fld>
+            <a:endParaRPr lang="en-US" dirty="0"/>
+          </a:p>
+        </p:txBody>
+      </p:sp>
+      <p:pic>
+        <p:nvPicPr>
+          <p:cNvPr id="24" name="Image 23">
+            <a:extLst>
+              <a:ext uri="{FF2B5EF4-FFF2-40B4-BE49-F238E27FC236}">
+                <a16:creationId xmlns:a16="http://schemas.microsoft.com/office/drawing/2014/main" id="{0C74E6A6-F1E8-4DD5-8CCE-FB8EECD7E9A7}"/>
+              </a:ext>
+            </a:extLst>
+          </p:cNvPr>
+          <p:cNvPicPr>
+            <a:picLocks noChangeAspect="1"/>
+          </p:cNvPicPr>
+          <p:nvPr/>
+        </p:nvPicPr>
+        <p:blipFill>
+          <a:blip r:embed="rId3"/>
+          <a:stretch>
+            <a:fillRect/>
+          </a:stretch>
+        </p:blipFill>
+        <p:spPr>
+          <a:xfrm>
+            <a:off x="4576043" y="679021"/>
+            <a:ext cx="3039914" cy="2749979"/>
+          </a:xfrm>
+          <a:prstGeom prst="rect">
+            <a:avLst/>
+          </a:prstGeom>
+        </p:spPr>
+      </p:pic>
+      <p:sp>
+        <p:nvSpPr>
+          <p:cNvPr id="4" name="ZoneTexte 3">
+            <a:extLst>
+              <a:ext uri="{FF2B5EF4-FFF2-40B4-BE49-F238E27FC236}">
+                <a16:creationId xmlns:a16="http://schemas.microsoft.com/office/drawing/2014/main" id="{E5BD4C69-0EBF-42EB-9712-849D3654344F}"/>
+              </a:ext>
+            </a:extLst>
+          </p:cNvPr>
+          <p:cNvSpPr txBox="1"/>
+          <p:nvPr/>
+        </p:nvSpPr>
+        <p:spPr>
+          <a:xfrm>
+            <a:off x="4657724" y="1981198"/>
+            <a:ext cx="2895601" cy="1352552"/>
+          </a:xfrm>
+          <a:prstGeom prst="rect">
+            <a:avLst/>
+          </a:prstGeom>
+          <a:solidFill>
+            <a:srgbClr val="E20613"/>
+          </a:solidFill>
+        </p:spPr>
+        <p:txBody>
+          <a:bodyPr wrap="square" rtlCol="0" anchor="ctr">
+            <a:noAutofit/>
+          </a:bodyPr>
+          <a:lstStyle/>
+          <a:p>
+            <a:pPr algn="ctr"/>
+            <a:r>
+              <a:rPr lang="fr-FR" sz="6000" dirty="0">
+                <a:solidFill>
+                  <a:schemeClr val="bg1"/>
+                </a:solidFill>
+                <a:latin typeface="Roboto Light"/>
+              </a:rPr>
+              <a:t>Merci !</a:t>
+            </a:r>
+            <a:endParaRPr lang="fr-CH" sz="6000" dirty="0">
+              <a:solidFill>
+                <a:schemeClr val="bg1"/>
+              </a:solidFill>
+              <a:latin typeface="Roboto Light"/>
+            </a:endParaRPr>
+          </a:p>
+        </p:txBody>
+      </p:sp>
+    </p:spTree>
+    <p:extLst>
+      <p:ext uri="{BB962C8B-B14F-4D97-AF65-F5344CB8AC3E}">
+        <p14:creationId xmlns:p14="http://schemas.microsoft.com/office/powerpoint/2010/main" val="6939507"/>
+      </p:ext>
+    </p:extLst>
+  </p:cSld>
+  <p:clrMapOvr>
+    <a:masterClrMapping/>
+  </p:clrMapOvr>
+  <p:transition spd="slow">
+    <p:push dir="u"/>
+  </p:transition>
+</p:sld>
+</file>
+
 <file path=ppt/slides/slide3.xml><?xml version="1.0" encoding="utf-8"?>
 <p:sld xmlns:a="http://schemas.openxmlformats.org/drawingml/2006/main" xmlns:r="http://schemas.openxmlformats.org/officeDocument/2006/relationships" xmlns:p="http://schemas.openxmlformats.org/presentationml/2006/main">
   <p:cSld>
@@ -25611,7 +26138,7 @@
           </a:effectLst>
           <a:extLst>
             <a:ext uri="{C572A759-6A51-4108-AA02-DFA0A04FC94B}">
-              <ma14:wrappingTextBoxFlag xmlns:ma14="http://schemas.microsoft.com/office/mac/drawingml/2011/main" xmlns="" val="1"/>
+              <ma14:wrappingTextBoxFlag xmlns="" xmlns:ma14="http://schemas.microsoft.com/office/mac/drawingml/2011/main" val="1"/>
             </a:ext>
           </a:extLst>
         </p:spPr>
@@ -25716,7 +26243,7 @@
           </a:effectLst>
           <a:extLst>
             <a:ext uri="{C572A759-6A51-4108-AA02-DFA0A04FC94B}">
-              <ma14:wrappingTextBoxFlag xmlns:ma14="http://schemas.microsoft.com/office/mac/drawingml/2011/main" xmlns="" val="1"/>
+              <ma14:wrappingTextBoxFlag xmlns="" xmlns:ma14="http://schemas.microsoft.com/office/mac/drawingml/2011/main" val="1"/>
             </a:ext>
           </a:extLst>
         </p:spPr>
@@ -25821,7 +26348,7 @@
           </a:effectLst>
           <a:extLst>
             <a:ext uri="{C572A759-6A51-4108-AA02-DFA0A04FC94B}">
-              <ma14:wrappingTextBoxFlag xmlns:ma14="http://schemas.microsoft.com/office/mac/drawingml/2011/main" xmlns="" val="1"/>
+              <ma14:wrappingTextBoxFlag xmlns="" xmlns:ma14="http://schemas.microsoft.com/office/mac/drawingml/2011/main" val="1"/>
             </a:ext>
           </a:extLst>
         </p:spPr>
@@ -25926,7 +26453,7 @@
           </a:effectLst>
           <a:extLst>
             <a:ext uri="{C572A759-6A51-4108-AA02-DFA0A04FC94B}">
-              <ma14:wrappingTextBoxFlag xmlns:ma14="http://schemas.microsoft.com/office/mac/drawingml/2011/main" xmlns="" val="1"/>
+              <ma14:wrappingTextBoxFlag xmlns="" xmlns:ma14="http://schemas.microsoft.com/office/mac/drawingml/2011/main" val="1"/>
             </a:ext>
           </a:extLst>
         </p:spPr>
@@ -26034,7 +26561,7 @@
           </a:effectLst>
           <a:extLst>
             <a:ext uri="{C572A759-6A51-4108-AA02-DFA0A04FC94B}">
-              <ma14:wrappingTextBoxFlag xmlns:ma14="http://schemas.microsoft.com/office/mac/drawingml/2011/main" xmlns="" val="1"/>
+              <ma14:wrappingTextBoxFlag xmlns="" xmlns:ma14="http://schemas.microsoft.com/office/mac/drawingml/2011/main" val="1"/>
             </a:ext>
           </a:extLst>
         </p:spPr>

</xml_diff>